<commit_message>
Add iam in ppt
</commit_message>
<xml_diff>
--- a/AWS.pptx
+++ b/AWS.pptx
@@ -5,27 +5,28 @@
     <p:sldMasterId id="2147483648" r:id="rId1"/>
   </p:sldMasterIdLst>
   <p:notesMasterIdLst>
-    <p:notesMasterId r:id="rId20"/>
+    <p:notesMasterId r:id="rId21"/>
   </p:notesMasterIdLst>
   <p:sldIdLst>
     <p:sldId id="256" r:id="rId2"/>
     <p:sldId id="257" r:id="rId3"/>
     <p:sldId id="258" r:id="rId4"/>
-    <p:sldId id="259" r:id="rId5"/>
-    <p:sldId id="260" r:id="rId6"/>
-    <p:sldId id="261" r:id="rId7"/>
-    <p:sldId id="262" r:id="rId8"/>
-    <p:sldId id="264" r:id="rId9"/>
-    <p:sldId id="263" r:id="rId10"/>
-    <p:sldId id="265" r:id="rId11"/>
-    <p:sldId id="266" r:id="rId12"/>
-    <p:sldId id="267" r:id="rId13"/>
-    <p:sldId id="268" r:id="rId14"/>
-    <p:sldId id="270" r:id="rId15"/>
-    <p:sldId id="269" r:id="rId16"/>
-    <p:sldId id="274" r:id="rId17"/>
-    <p:sldId id="273" r:id="rId18"/>
-    <p:sldId id="272" r:id="rId19"/>
+    <p:sldId id="275" r:id="rId5"/>
+    <p:sldId id="259" r:id="rId6"/>
+    <p:sldId id="260" r:id="rId7"/>
+    <p:sldId id="261" r:id="rId8"/>
+    <p:sldId id="262" r:id="rId9"/>
+    <p:sldId id="264" r:id="rId10"/>
+    <p:sldId id="263" r:id="rId11"/>
+    <p:sldId id="265" r:id="rId12"/>
+    <p:sldId id="266" r:id="rId13"/>
+    <p:sldId id="267" r:id="rId14"/>
+    <p:sldId id="268" r:id="rId15"/>
+    <p:sldId id="270" r:id="rId16"/>
+    <p:sldId id="269" r:id="rId17"/>
+    <p:sldId id="274" r:id="rId18"/>
+    <p:sldId id="273" r:id="rId19"/>
+    <p:sldId id="272" r:id="rId20"/>
   </p:sldIdLst>
   <p:sldSz cx="12192000" cy="6858000"/>
   <p:notesSz cx="6858000" cy="9144000"/>
@@ -124,6 +125,11 @@
       </a:defRPr>
     </a:lvl9pPr>
   </p:defaultTextStyle>
+  <p:extLst>
+    <p:ext uri="{EFAFB233-063F-42B5-8137-9DF3F51BA10A}">
+      <p15:sldGuideLst xmlns:p15="http://schemas.microsoft.com/office/powerpoint/2012/main"/>
+    </p:ext>
+  </p:extLst>
 </p:presentation>
 </file>
 
@@ -6543,7 +6549,7 @@
       </p:grpSpPr>
       <p:pic>
         <p:nvPicPr>
-          <p:cNvPr id="34" name="Picture 15">
+          <p:cNvPr id="10" name="Picture 9">
             <a:extLst>
               <a:ext uri="{FF2B5EF4-FFF2-40B4-BE49-F238E27FC236}">
                 <a16:creationId xmlns:a16="http://schemas.microsoft.com/office/drawing/2014/main" id="{41B68C77-138E-4BF7-A276-BD0C78A4219F}"/>
@@ -6587,7 +6593,7 @@
       </p:pic>
       <p:pic>
         <p:nvPicPr>
-          <p:cNvPr id="35" name="Picture 17">
+          <p:cNvPr id="12" name="Picture 11">
             <a:extLst>
               <a:ext uri="{FF2B5EF4-FFF2-40B4-BE49-F238E27FC236}">
                 <a16:creationId xmlns:a16="http://schemas.microsoft.com/office/drawing/2014/main" id="{7C268552-D473-46ED-B1B8-422042C4DEF1}"/>
@@ -6631,7 +6637,7 @@
       </p:pic>
       <p:sp>
         <p:nvSpPr>
-          <p:cNvPr id="36" name="Oval 19">
+          <p:cNvPr id="14" name="Oval 13">
             <a:extLst>
               <a:ext uri="{FF2B5EF4-FFF2-40B4-BE49-F238E27FC236}">
                 <a16:creationId xmlns:a16="http://schemas.microsoft.com/office/drawing/2014/main" id="{4AC0CD9D-7610-4620-93B4-798CCD9AB581}"/>
@@ -6711,7 +6717,7 @@
       </p:sp>
       <p:pic>
         <p:nvPicPr>
-          <p:cNvPr id="37" name="Picture 21">
+          <p:cNvPr id="16" name="Picture 15">
             <a:extLst>
               <a:ext uri="{FF2B5EF4-FFF2-40B4-BE49-F238E27FC236}">
                 <a16:creationId xmlns:a16="http://schemas.microsoft.com/office/drawing/2014/main" id="{B9238B3E-24AA-439A-B527-6C5DF6D72145}"/>
@@ -6755,7 +6761,7 @@
       </p:pic>
       <p:pic>
         <p:nvPicPr>
-          <p:cNvPr id="38" name="Picture 23">
+          <p:cNvPr id="18" name="Picture 17">
             <a:extLst>
               <a:ext uri="{FF2B5EF4-FFF2-40B4-BE49-F238E27FC236}">
                 <a16:creationId xmlns:a16="http://schemas.microsoft.com/office/drawing/2014/main" id="{69F01145-BEA3-4CBF-AA21-10077B948CA8}"/>
@@ -6799,7 +6805,7 @@
       </p:pic>
       <p:sp>
         <p:nvSpPr>
-          <p:cNvPr id="39" name="Rectangle 25">
+          <p:cNvPr id="20" name="Rectangle 19">
             <a:extLst>
               <a:ext uri="{FF2B5EF4-FFF2-40B4-BE49-F238E27FC236}">
                 <a16:creationId xmlns:a16="http://schemas.microsoft.com/office/drawing/2014/main" id="{DE4D62F9-188E-4530-84C2-24BDEE4BEB82}"/>
@@ -6868,8 +6874,8 @@
         </p:nvSpPr>
         <p:spPr>
           <a:xfrm>
-            <a:off x="7148030" y="2508558"/>
-            <a:ext cx="4397828" cy="1468075"/>
+            <a:off x="6683829" y="1447800"/>
+            <a:ext cx="5007428" cy="3329581"/>
           </a:xfrm>
         </p:spPr>
         <p:txBody>
@@ -6927,6 +6933,16 @@
               </a:rPr>
               <a:t> RDS</a:t>
             </a:r>
+            <a:br>
+              <a:rPr lang="en-US" sz="5600" b="0" i="0" kern="1200" dirty="0">
+                <a:solidFill>
+                  <a:schemeClr val="tx2"/>
+                </a:solidFill>
+                <a:latin typeface="+mj-lt"/>
+                <a:ea typeface="+mj-ea"/>
+                <a:cs typeface="+mj-cs"/>
+              </a:rPr>
+            </a:br>
             <a:endParaRPr lang="en-US" sz="5600" b="0" i="0" kern="1200" dirty="0">
               <a:solidFill>
                 <a:schemeClr val="tx2"/>
@@ -6940,10 +6956,10 @@
       </p:sp>
       <p:pic>
         <p:nvPicPr>
-          <p:cNvPr id="11" name="Image 10">
+          <p:cNvPr id="5" name="Image 4">
             <a:extLst>
               <a:ext uri="{FF2B5EF4-FFF2-40B4-BE49-F238E27FC236}">
-                <a16:creationId xmlns:a16="http://schemas.microsoft.com/office/drawing/2014/main" id="{4877F94F-5DFF-44E9-91DF-92CCCE8D4836}"/>
+                <a16:creationId xmlns:a16="http://schemas.microsoft.com/office/drawing/2014/main" id="{0753D3C2-60EB-4393-BDA3-EB5836B39730}"/>
               </a:ext>
             </a:extLst>
           </p:cNvPr>
@@ -6958,8 +6974,8 @@
         </p:blipFill>
         <p:spPr>
           <a:xfrm>
-            <a:off x="784708" y="570703"/>
-            <a:ext cx="5088416" cy="3405930"/>
+            <a:off x="1081703" y="647698"/>
+            <a:ext cx="4574858" cy="5562139"/>
           </a:xfrm>
           <a:prstGeom prst="rect">
             <a:avLst/>
@@ -7021,38 +7037,10 @@
           </a:p>
         </p:txBody>
       </p:sp>
-      <p:pic>
-        <p:nvPicPr>
-          <p:cNvPr id="25" name="Image 24">
-            <a:extLst>
-              <a:ext uri="{FF2B5EF4-FFF2-40B4-BE49-F238E27FC236}">
-                <a16:creationId xmlns:a16="http://schemas.microsoft.com/office/drawing/2014/main" id="{40AF919F-AA3D-4549-87C4-3C467B09D6E4}"/>
-              </a:ext>
-            </a:extLst>
-          </p:cNvPr>
-          <p:cNvPicPr/>
-          <p:nvPr/>
-        </p:nvPicPr>
-        <p:blipFill>
-          <a:blip r:embed="rId8"/>
-          <a:stretch>
-            <a:fillRect/>
-          </a:stretch>
-        </p:blipFill>
-        <p:spPr>
-          <a:xfrm>
-            <a:off x="792614" y="4128557"/>
-            <a:ext cx="5080510" cy="2448411"/>
-          </a:xfrm>
-          <a:prstGeom prst="rect">
-            <a:avLst/>
-          </a:prstGeom>
-        </p:spPr>
-      </p:pic>
     </p:spTree>
     <p:extLst>
       <p:ext uri="{BB962C8B-B14F-4D97-AF65-F5344CB8AC3E}">
-        <p14:creationId xmlns:p14="http://schemas.microsoft.com/office/powerpoint/2010/main" val="2236327823"/>
+        <p14:creationId xmlns:p14="http://schemas.microsoft.com/office/powerpoint/2010/main" val="2152293383"/>
       </p:ext>
     </p:extLst>
   </p:cSld>
@@ -7105,7 +7093,7 @@
       </p:grpSpPr>
       <p:pic>
         <p:nvPicPr>
-          <p:cNvPr id="16" name="Picture 15">
+          <p:cNvPr id="34" name="Picture 15">
             <a:extLst>
               <a:ext uri="{FF2B5EF4-FFF2-40B4-BE49-F238E27FC236}">
                 <a16:creationId xmlns:a16="http://schemas.microsoft.com/office/drawing/2014/main" id="{41B68C77-138E-4BF7-A276-BD0C78A4219F}"/>
@@ -7149,7 +7137,7 @@
       </p:pic>
       <p:pic>
         <p:nvPicPr>
-          <p:cNvPr id="18" name="Picture 17">
+          <p:cNvPr id="35" name="Picture 17">
             <a:extLst>
               <a:ext uri="{FF2B5EF4-FFF2-40B4-BE49-F238E27FC236}">
                 <a16:creationId xmlns:a16="http://schemas.microsoft.com/office/drawing/2014/main" id="{7C268552-D473-46ED-B1B8-422042C4DEF1}"/>
@@ -7193,7 +7181,7 @@
       </p:pic>
       <p:sp>
         <p:nvSpPr>
-          <p:cNvPr id="20" name="Oval 19">
+          <p:cNvPr id="36" name="Oval 19">
             <a:extLst>
               <a:ext uri="{FF2B5EF4-FFF2-40B4-BE49-F238E27FC236}">
                 <a16:creationId xmlns:a16="http://schemas.microsoft.com/office/drawing/2014/main" id="{4AC0CD9D-7610-4620-93B4-798CCD9AB581}"/>
@@ -7273,7 +7261,7 @@
       </p:sp>
       <p:pic>
         <p:nvPicPr>
-          <p:cNvPr id="22" name="Picture 21">
+          <p:cNvPr id="37" name="Picture 21">
             <a:extLst>
               <a:ext uri="{FF2B5EF4-FFF2-40B4-BE49-F238E27FC236}">
                 <a16:creationId xmlns:a16="http://schemas.microsoft.com/office/drawing/2014/main" id="{B9238B3E-24AA-439A-B527-6C5DF6D72145}"/>
@@ -7317,7 +7305,7 @@
       </p:pic>
       <p:pic>
         <p:nvPicPr>
-          <p:cNvPr id="24" name="Picture 23">
+          <p:cNvPr id="38" name="Picture 23">
             <a:extLst>
               <a:ext uri="{FF2B5EF4-FFF2-40B4-BE49-F238E27FC236}">
                 <a16:creationId xmlns:a16="http://schemas.microsoft.com/office/drawing/2014/main" id="{69F01145-BEA3-4CBF-AA21-10077B948CA8}"/>
@@ -7361,7 +7349,7 @@
       </p:pic>
       <p:sp>
         <p:nvSpPr>
-          <p:cNvPr id="26" name="Rectangle 25">
+          <p:cNvPr id="39" name="Rectangle 25">
             <a:extLst>
               <a:ext uri="{FF2B5EF4-FFF2-40B4-BE49-F238E27FC236}">
                 <a16:creationId xmlns:a16="http://schemas.microsoft.com/office/drawing/2014/main" id="{DE4D62F9-188E-4530-84C2-24BDEE4BEB82}"/>
@@ -7430,8 +7418,8 @@
         </p:nvSpPr>
         <p:spPr>
           <a:xfrm>
-            <a:off x="6903831" y="2146706"/>
-            <a:ext cx="4397828" cy="2755084"/>
+            <a:off x="7148030" y="2508558"/>
+            <a:ext cx="4397828" cy="1468075"/>
           </a:xfrm>
         </p:spPr>
         <p:txBody>
@@ -7489,16 +7477,6 @@
               </a:rPr>
               <a:t> RDS</a:t>
             </a:r>
-            <a:br>
-              <a:rPr lang="en-US" sz="5600" b="0" i="0" kern="1200" dirty="0">
-                <a:solidFill>
-                  <a:schemeClr val="tx2"/>
-                </a:solidFill>
-                <a:latin typeface="+mj-lt"/>
-                <a:ea typeface="+mj-ea"/>
-                <a:cs typeface="+mj-cs"/>
-              </a:rPr>
-            </a:br>
             <a:endParaRPr lang="en-US" sz="5600" b="0" i="0" kern="1200" dirty="0">
               <a:solidFill>
                 <a:schemeClr val="tx2"/>
@@ -7515,7 +7493,7 @@
           <p:cNvPr id="11" name="Image 10">
             <a:extLst>
               <a:ext uri="{FF2B5EF4-FFF2-40B4-BE49-F238E27FC236}">
-                <a16:creationId xmlns:a16="http://schemas.microsoft.com/office/drawing/2014/main" id="{6FD23F9B-39B4-4AF0-AAE9-514FAA80AA8D}"/>
+                <a16:creationId xmlns:a16="http://schemas.microsoft.com/office/drawing/2014/main" id="{4877F94F-5DFF-44E9-91DF-92CCCE8D4836}"/>
               </a:ext>
             </a:extLst>
           </p:cNvPr>
@@ -7530,8 +7508,8 @@
         </p:blipFill>
         <p:spPr>
           <a:xfrm>
-            <a:off x="761206" y="461085"/>
-            <a:ext cx="5127573" cy="6126327"/>
+            <a:off x="784708" y="570703"/>
+            <a:ext cx="5088416" cy="3405930"/>
           </a:xfrm>
           <a:prstGeom prst="rect">
             <a:avLst/>
@@ -7593,10 +7571,38 @@
           </a:p>
         </p:txBody>
       </p:sp>
+      <p:pic>
+        <p:nvPicPr>
+          <p:cNvPr id="25" name="Image 24">
+            <a:extLst>
+              <a:ext uri="{FF2B5EF4-FFF2-40B4-BE49-F238E27FC236}">
+                <a16:creationId xmlns:a16="http://schemas.microsoft.com/office/drawing/2014/main" id="{40AF919F-AA3D-4549-87C4-3C467B09D6E4}"/>
+              </a:ext>
+            </a:extLst>
+          </p:cNvPr>
+          <p:cNvPicPr/>
+          <p:nvPr/>
+        </p:nvPicPr>
+        <p:blipFill>
+          <a:blip r:embed="rId8"/>
+          <a:stretch>
+            <a:fillRect/>
+          </a:stretch>
+        </p:blipFill>
+        <p:spPr>
+          <a:xfrm>
+            <a:off x="792614" y="4128557"/>
+            <a:ext cx="5080510" cy="2448411"/>
+          </a:xfrm>
+          <a:prstGeom prst="rect">
+            <a:avLst/>
+          </a:prstGeom>
+        </p:spPr>
+      </p:pic>
     </p:spTree>
     <p:extLst>
       <p:ext uri="{BB962C8B-B14F-4D97-AF65-F5344CB8AC3E}">
-        <p14:creationId xmlns:p14="http://schemas.microsoft.com/office/powerpoint/2010/main" val="266241088"/>
+        <p14:creationId xmlns:p14="http://schemas.microsoft.com/office/powerpoint/2010/main" val="2236327823"/>
       </p:ext>
     </p:extLst>
   </p:cSld>
@@ -7609,6 +7615,30 @@
 <file path=ppt/slides/slide12.xml><?xml version="1.0" encoding="utf-8"?>
 <p:sld xmlns:a="http://schemas.openxmlformats.org/drawingml/2006/main" xmlns:r="http://schemas.openxmlformats.org/officeDocument/2006/relationships" xmlns:p="http://schemas.openxmlformats.org/presentationml/2006/main">
   <p:cSld>
+    <p:bg>
+      <p:bgPr>
+        <a:blipFill rotWithShape="1">
+          <a:blip r:embed="rId2">
+            <a:duotone>
+              <a:schemeClr val="bg2">
+                <a:shade val="69000"/>
+                <a:hueMod val="108000"/>
+                <a:satMod val="164000"/>
+                <a:lumMod val="74000"/>
+              </a:schemeClr>
+              <a:schemeClr val="bg2">
+                <a:tint val="96000"/>
+                <a:hueMod val="88000"/>
+                <a:satMod val="140000"/>
+                <a:lumMod val="132000"/>
+              </a:schemeClr>
+            </a:duotone>
+          </a:blip>
+          <a:stretch/>
+        </a:blipFill>
+        <a:effectLst/>
+      </p:bgPr>
+    </p:bg>
     <p:spTree>
       <p:nvGrpSpPr>
         <p:cNvPr id="1" name=""/>
@@ -7623,75 +7653,419 @@
           <a:chExt cx="0" cy="0"/>
         </a:xfrm>
       </p:grpSpPr>
-      <p:sp>
-        <p:nvSpPr>
-          <p:cNvPr id="2" name="Titre 1">
-            <a:extLst>
-              <a:ext uri="{FF2B5EF4-FFF2-40B4-BE49-F238E27FC236}">
-                <a16:creationId xmlns:a16="http://schemas.microsoft.com/office/drawing/2014/main" id="{BE0F64FA-C67B-43FB-B6A9-F0C4A0C94D9A}"/>
-              </a:ext>
-            </a:extLst>
-          </p:cNvPr>
-          <p:cNvSpPr>
-            <a:spLocks noGrp="1"/>
-          </p:cNvSpPr>
-          <p:nvPr>
-            <p:ph type="title"/>
-          </p:nvPr>
-        </p:nvSpPr>
-        <p:spPr>
-          <a:xfrm>
-            <a:off x="646111" y="452718"/>
-            <a:ext cx="9404723" cy="767687"/>
-          </a:xfrm>
-        </p:spPr>
-        <p:txBody>
-          <a:bodyPr/>
-          <a:lstStyle/>
-          <a:p>
-            <a:pPr algn="ctr"/>
-            <a:r>
-              <a:rPr lang="fr-FR" sz="3600" dirty="0"/>
-              <a:t>Machine 1 – EC2</a:t>
-            </a:r>
-          </a:p>
-        </p:txBody>
-      </p:sp>
-      <p:sp>
-        <p:nvSpPr>
-          <p:cNvPr id="4" name="Espace réservé du numéro de diapositive 3">
-            <a:extLst>
-              <a:ext uri="{FF2B5EF4-FFF2-40B4-BE49-F238E27FC236}">
-                <a16:creationId xmlns:a16="http://schemas.microsoft.com/office/drawing/2014/main" id="{38249652-F7EA-4630-A286-4A955786FBEF}"/>
-              </a:ext>
-            </a:extLst>
-          </p:cNvPr>
-          <p:cNvSpPr>
-            <a:spLocks noGrp="1"/>
-          </p:cNvSpPr>
-          <p:nvPr>
-            <p:ph type="sldNum" sz="quarter" idx="12"/>
-          </p:nvPr>
-        </p:nvSpPr>
-        <p:spPr/>
-        <p:txBody>
-          <a:bodyPr/>
-          <a:lstStyle/>
-          <a:p>
-            <a:fld id="{D57F1E4F-1CFF-5643-939E-02111984F565}" type="slidenum">
-              <a:rPr lang="en-US" smtClean="0"/>
-              <a:t>12</a:t>
-            </a:fld>
-            <a:endParaRPr lang="en-US" dirty="0"/>
-          </a:p>
-        </p:txBody>
-      </p:sp>
       <p:pic>
         <p:nvPicPr>
-          <p:cNvPr id="5" name="Image 4">
+          <p:cNvPr id="16" name="Picture 15">
             <a:extLst>
               <a:ext uri="{FF2B5EF4-FFF2-40B4-BE49-F238E27FC236}">
-                <a16:creationId xmlns:a16="http://schemas.microsoft.com/office/drawing/2014/main" id="{171A9683-561F-4F62-8E54-06FCFE6A630E}"/>
+                <a16:creationId xmlns:a16="http://schemas.microsoft.com/office/drawing/2014/main" id="{41B68C77-138E-4BF7-A276-BD0C78A4219F}"/>
+              </a:ext>
+              <a:ext uri="{C183D7F6-B498-43B3-948B-1728B52AA6E4}">
+                <adec:decorative xmlns:adec="http://schemas.microsoft.com/office/drawing/2017/decorative" val="1"/>
+              </a:ext>
+            </a:extLst>
+          </p:cNvPr>
+          <p:cNvPicPr>
+            <a:picLocks noGrp="1" noRot="1" noChangeAspect="1" noMove="1" noResize="1" noEditPoints="1" noAdjustHandles="1" noChangeArrowheads="1" noChangeShapeType="1" noCrop="1"/>
+          </p:cNvPicPr>
+          <p:nvPr>
+            <p:extLst>
+              <p:ext uri="{386F3935-93C4-4BCD-93E2-E3B085C9AB24}">
+                <p16:designElem xmlns:p16="http://schemas.microsoft.com/office/powerpoint/2015/main" val="1"/>
+              </p:ext>
+            </p:extLst>
+          </p:nvPr>
+        </p:nvPicPr>
+        <p:blipFill rotWithShape="1">
+          <a:blip r:embed="rId3">
+            <a:extLst>
+              <a:ext uri="{28A0092B-C50C-407E-A947-70E740481C1C}">
+                <a14:useLocalDpi xmlns:a14="http://schemas.microsoft.com/office/drawing/2010/main" val="0"/>
+              </a:ext>
+            </a:extLst>
+          </a:blip>
+          <a:srcRect l="3613"/>
+          <a:stretch/>
+        </p:blipFill>
+        <p:spPr>
+          <a:xfrm>
+            <a:off x="0" y="2669685"/>
+            <a:ext cx="4037012" cy="4188315"/>
+          </a:xfrm>
+          <a:prstGeom prst="rect">
+            <a:avLst/>
+          </a:prstGeom>
+        </p:spPr>
+      </p:pic>
+      <p:pic>
+        <p:nvPicPr>
+          <p:cNvPr id="18" name="Picture 17">
+            <a:extLst>
+              <a:ext uri="{FF2B5EF4-FFF2-40B4-BE49-F238E27FC236}">
+                <a16:creationId xmlns:a16="http://schemas.microsoft.com/office/drawing/2014/main" id="{7C268552-D473-46ED-B1B8-422042C4DEF1}"/>
+              </a:ext>
+              <a:ext uri="{C183D7F6-B498-43B3-948B-1728B52AA6E4}">
+                <adec:decorative xmlns:adec="http://schemas.microsoft.com/office/drawing/2017/decorative" val="1"/>
+              </a:ext>
+            </a:extLst>
+          </p:cNvPr>
+          <p:cNvPicPr>
+            <a:picLocks noGrp="1" noRot="1" noChangeAspect="1" noMove="1" noResize="1" noEditPoints="1" noAdjustHandles="1" noChangeArrowheads="1" noChangeShapeType="1" noCrop="1"/>
+          </p:cNvPicPr>
+          <p:nvPr>
+            <p:extLst>
+              <p:ext uri="{386F3935-93C4-4BCD-93E2-E3B085C9AB24}">
+                <p16:designElem xmlns:p16="http://schemas.microsoft.com/office/powerpoint/2015/main" val="1"/>
+              </p:ext>
+            </p:extLst>
+          </p:nvPr>
+        </p:nvPicPr>
+        <p:blipFill rotWithShape="1">
+          <a:blip r:embed="rId4">
+            <a:extLst>
+              <a:ext uri="{28A0092B-C50C-407E-A947-70E740481C1C}">
+                <a14:useLocalDpi xmlns:a14="http://schemas.microsoft.com/office/drawing/2010/main" val="0"/>
+              </a:ext>
+            </a:extLst>
+          </a:blip>
+          <a:srcRect l="35640"/>
+          <a:stretch/>
+        </p:blipFill>
+        <p:spPr>
+          <a:xfrm>
+            <a:off x="0" y="2892347"/>
+            <a:ext cx="1522412" cy="2365453"/>
+          </a:xfrm>
+          <a:prstGeom prst="rect">
+            <a:avLst/>
+          </a:prstGeom>
+        </p:spPr>
+      </p:pic>
+      <p:sp>
+        <p:nvSpPr>
+          <p:cNvPr id="20" name="Oval 19">
+            <a:extLst>
+              <a:ext uri="{FF2B5EF4-FFF2-40B4-BE49-F238E27FC236}">
+                <a16:creationId xmlns:a16="http://schemas.microsoft.com/office/drawing/2014/main" id="{4AC0CD9D-7610-4620-93B4-798CCD9AB581}"/>
+              </a:ext>
+              <a:ext uri="{C183D7F6-B498-43B3-948B-1728B52AA6E4}">
+                <adec:decorative xmlns:adec="http://schemas.microsoft.com/office/drawing/2017/decorative" val="1"/>
+              </a:ext>
+            </a:extLst>
+          </p:cNvPr>
+          <p:cNvSpPr>
+            <a:spLocks noGrp="1" noRot="1" noChangeAspect="1" noMove="1" noResize="1" noEditPoints="1" noAdjustHandles="1" noChangeArrowheads="1" noChangeShapeType="1" noTextEdit="1"/>
+          </p:cNvSpPr>
+          <p:nvPr>
+            <p:extLst>
+              <p:ext uri="{386F3935-93C4-4BCD-93E2-E3B085C9AB24}">
+                <p16:designElem xmlns:p16="http://schemas.microsoft.com/office/powerpoint/2015/main" val="1"/>
+              </p:ext>
+            </p:extLst>
+          </p:nvPr>
+        </p:nvSpPr>
+        <p:spPr>
+          <a:xfrm>
+            <a:off x="8609012" y="1676400"/>
+            <a:ext cx="2819400" cy="2819400"/>
+          </a:xfrm>
+          <a:prstGeom prst="ellipse">
+            <a:avLst/>
+          </a:prstGeom>
+          <a:gradFill flip="none" rotWithShape="1">
+            <a:gsLst>
+              <a:gs pos="0">
+                <a:schemeClr val="bg2">
+                  <a:lumMod val="60000"/>
+                  <a:lumOff val="40000"/>
+                  <a:alpha val="7000"/>
+                </a:schemeClr>
+              </a:gs>
+              <a:gs pos="69000">
+                <a:schemeClr val="bg2">
+                  <a:lumMod val="60000"/>
+                  <a:lumOff val="40000"/>
+                  <a:alpha val="0"/>
+                </a:schemeClr>
+              </a:gs>
+              <a:gs pos="36000">
+                <a:schemeClr val="bg2">
+                  <a:lumMod val="60000"/>
+                  <a:lumOff val="40000"/>
+                  <a:alpha val="6000"/>
+                </a:schemeClr>
+              </a:gs>
+            </a:gsLst>
+            <a:path path="circle">
+              <a:fillToRect l="50000" t="50000" r="50000" b="50000"/>
+            </a:path>
+            <a:tileRect/>
+          </a:gradFill>
+          <a:ln>
+            <a:noFill/>
+          </a:ln>
+          <a:effectLst/>
+        </p:spPr>
+        <p:style>
+          <a:lnRef idx="1">
+            <a:schemeClr val="accent1"/>
+          </a:lnRef>
+          <a:fillRef idx="3">
+            <a:schemeClr val="accent1"/>
+          </a:fillRef>
+          <a:effectRef idx="2">
+            <a:schemeClr val="accent1"/>
+          </a:effectRef>
+          <a:fontRef idx="minor">
+            <a:schemeClr val="lt1"/>
+          </a:fontRef>
+        </p:style>
+      </p:sp>
+      <p:pic>
+        <p:nvPicPr>
+          <p:cNvPr id="22" name="Picture 21">
+            <a:extLst>
+              <a:ext uri="{FF2B5EF4-FFF2-40B4-BE49-F238E27FC236}">
+                <a16:creationId xmlns:a16="http://schemas.microsoft.com/office/drawing/2014/main" id="{B9238B3E-24AA-439A-B527-6C5DF6D72145}"/>
+              </a:ext>
+              <a:ext uri="{C183D7F6-B498-43B3-948B-1728B52AA6E4}">
+                <adec:decorative xmlns:adec="http://schemas.microsoft.com/office/drawing/2017/decorative" val="1"/>
+              </a:ext>
+            </a:extLst>
+          </p:cNvPr>
+          <p:cNvPicPr>
+            <a:picLocks noGrp="1" noRot="1" noChangeAspect="1" noMove="1" noResize="1" noEditPoints="1" noAdjustHandles="1" noChangeArrowheads="1" noChangeShapeType="1" noCrop="1"/>
+          </p:cNvPicPr>
+          <p:nvPr>
+            <p:extLst>
+              <p:ext uri="{386F3935-93C4-4BCD-93E2-E3B085C9AB24}">
+                <p16:designElem xmlns:p16="http://schemas.microsoft.com/office/powerpoint/2015/main" val="1"/>
+              </p:ext>
+            </p:extLst>
+          </p:nvPr>
+        </p:nvPicPr>
+        <p:blipFill rotWithShape="1">
+          <a:blip r:embed="rId5">
+            <a:extLst>
+              <a:ext uri="{28A0092B-C50C-407E-A947-70E740481C1C}">
+                <a14:useLocalDpi xmlns:a14="http://schemas.microsoft.com/office/drawing/2010/main" val="0"/>
+              </a:ext>
+            </a:extLst>
+          </a:blip>
+          <a:srcRect t="28813"/>
+          <a:stretch/>
+        </p:blipFill>
+        <p:spPr>
+          <a:xfrm>
+            <a:off x="7999412" y="0"/>
+            <a:ext cx="1603387" cy="1141407"/>
+          </a:xfrm>
+          <a:prstGeom prst="rect">
+            <a:avLst/>
+          </a:prstGeom>
+        </p:spPr>
+      </p:pic>
+      <p:pic>
+        <p:nvPicPr>
+          <p:cNvPr id="24" name="Picture 23">
+            <a:extLst>
+              <a:ext uri="{FF2B5EF4-FFF2-40B4-BE49-F238E27FC236}">
+                <a16:creationId xmlns:a16="http://schemas.microsoft.com/office/drawing/2014/main" id="{69F01145-BEA3-4CBF-AA21-10077B948CA8}"/>
+              </a:ext>
+              <a:ext uri="{C183D7F6-B498-43B3-948B-1728B52AA6E4}">
+                <adec:decorative xmlns:adec="http://schemas.microsoft.com/office/drawing/2017/decorative" val="1"/>
+              </a:ext>
+            </a:extLst>
+          </p:cNvPr>
+          <p:cNvPicPr>
+            <a:picLocks noGrp="1" noRot="1" noChangeAspect="1" noMove="1" noResize="1" noEditPoints="1" noAdjustHandles="1" noChangeArrowheads="1" noChangeShapeType="1" noCrop="1"/>
+          </p:cNvPicPr>
+          <p:nvPr>
+            <p:extLst>
+              <p:ext uri="{386F3935-93C4-4BCD-93E2-E3B085C9AB24}">
+                <p16:designElem xmlns:p16="http://schemas.microsoft.com/office/powerpoint/2015/main" val="1"/>
+              </p:ext>
+            </p:extLst>
+          </p:nvPr>
+        </p:nvPicPr>
+        <p:blipFill rotWithShape="1">
+          <a:blip r:embed="rId6">
+            <a:extLst>
+              <a:ext uri="{28A0092B-C50C-407E-A947-70E740481C1C}">
+                <a14:useLocalDpi xmlns:a14="http://schemas.microsoft.com/office/drawing/2010/main" val="0"/>
+              </a:ext>
+            </a:extLst>
+          </a:blip>
+          <a:srcRect b="23320"/>
+          <a:stretch/>
+        </p:blipFill>
+        <p:spPr>
+          <a:xfrm>
+            <a:off x="8605878" y="6096000"/>
+            <a:ext cx="993734" cy="762000"/>
+          </a:xfrm>
+          <a:prstGeom prst="rect">
+            <a:avLst/>
+          </a:prstGeom>
+        </p:spPr>
+      </p:pic>
+      <p:sp>
+        <p:nvSpPr>
+          <p:cNvPr id="26" name="Rectangle 25">
+            <a:extLst>
+              <a:ext uri="{FF2B5EF4-FFF2-40B4-BE49-F238E27FC236}">
+                <a16:creationId xmlns:a16="http://schemas.microsoft.com/office/drawing/2014/main" id="{DE4D62F9-188E-4530-84C2-24BDEE4BEB82}"/>
+              </a:ext>
+              <a:ext uri="{C183D7F6-B498-43B3-948B-1728B52AA6E4}">
+                <adec:decorative xmlns:adec="http://schemas.microsoft.com/office/drawing/2017/decorative" val="1"/>
+              </a:ext>
+            </a:extLst>
+          </p:cNvPr>
+          <p:cNvSpPr>
+            <a:spLocks noGrp="1" noRot="1" noChangeAspect="1" noMove="1" noResize="1" noEditPoints="1" noAdjustHandles="1" noChangeArrowheads="1" noChangeShapeType="1" noTextEdit="1"/>
+          </p:cNvSpPr>
+          <p:nvPr>
+            <p:extLst>
+              <p:ext uri="{386F3935-93C4-4BCD-93E2-E3B085C9AB24}">
+                <p16:designElem xmlns:p16="http://schemas.microsoft.com/office/powerpoint/2015/main" val="1"/>
+              </p:ext>
+            </p:extLst>
+          </p:nvPr>
+        </p:nvSpPr>
+        <p:spPr>
+          <a:xfrm>
+            <a:off x="10437812" y="0"/>
+            <a:ext cx="685800" cy="1143000"/>
+          </a:xfrm>
+          <a:prstGeom prst="rect">
+            <a:avLst/>
+          </a:prstGeom>
+          <a:solidFill>
+            <a:schemeClr val="accent1"/>
+          </a:solidFill>
+          <a:ln>
+            <a:noFill/>
+          </a:ln>
+        </p:spPr>
+        <p:style>
+          <a:lnRef idx="1">
+            <a:schemeClr val="accent1"/>
+          </a:lnRef>
+          <a:fillRef idx="3">
+            <a:schemeClr val="accent1"/>
+          </a:fillRef>
+          <a:effectRef idx="2">
+            <a:schemeClr val="accent1"/>
+          </a:effectRef>
+          <a:fontRef idx="minor">
+            <a:schemeClr val="lt1"/>
+          </a:fontRef>
+        </p:style>
+      </p:sp>
+      <p:sp>
+        <p:nvSpPr>
+          <p:cNvPr id="2" name="Titre 1">
+            <a:extLst>
+              <a:ext uri="{FF2B5EF4-FFF2-40B4-BE49-F238E27FC236}">
+                <a16:creationId xmlns:a16="http://schemas.microsoft.com/office/drawing/2014/main" id="{9D0E9B87-70C6-4F83-ABAB-8A07F967B344}"/>
+              </a:ext>
+            </a:extLst>
+          </p:cNvPr>
+          <p:cNvSpPr>
+            <a:spLocks noGrp="1"/>
+          </p:cNvSpPr>
+          <p:nvPr>
+            <p:ph type="title"/>
+          </p:nvPr>
+        </p:nvSpPr>
+        <p:spPr>
+          <a:xfrm>
+            <a:off x="6903831" y="2146706"/>
+            <a:ext cx="4397828" cy="2755084"/>
+          </a:xfrm>
+        </p:spPr>
+        <p:txBody>
+          <a:bodyPr vert="horz" lIns="91440" tIns="45720" rIns="91440" bIns="45720" rtlCol="0" anchor="b">
+            <a:normAutofit/>
+          </a:bodyPr>
+          <a:lstStyle/>
+          <a:p>
+            <a:pPr algn="ctr">
+              <a:lnSpc>
+                <a:spcPct val="90000"/>
+              </a:lnSpc>
+            </a:pPr>
+            <a:r>
+              <a:rPr lang="en-US" sz="4400" b="0" i="0" kern="1200" dirty="0" err="1">
+                <a:solidFill>
+                  <a:schemeClr val="tx2"/>
+                </a:solidFill>
+                <a:latin typeface="+mj-lt"/>
+                <a:ea typeface="+mj-ea"/>
+                <a:cs typeface="+mj-cs"/>
+              </a:rPr>
+              <a:t>Création</a:t>
+            </a:r>
+            <a:r>
+              <a:rPr lang="en-US" sz="4400" b="0" i="0" kern="1200" dirty="0">
+                <a:solidFill>
+                  <a:schemeClr val="tx2"/>
+                </a:solidFill>
+                <a:latin typeface="+mj-lt"/>
+                <a:ea typeface="+mj-ea"/>
+                <a:cs typeface="+mj-cs"/>
+              </a:rPr>
+              <a:t> de la BDD </a:t>
+            </a:r>
+            <a:r>
+              <a:rPr lang="en-US" sz="4400" b="0" i="0" kern="1200" dirty="0" err="1">
+                <a:solidFill>
+                  <a:schemeClr val="tx2"/>
+                </a:solidFill>
+                <a:latin typeface="+mj-lt"/>
+                <a:ea typeface="+mj-ea"/>
+                <a:cs typeface="+mj-cs"/>
+              </a:rPr>
+              <a:t>Mysql</a:t>
+            </a:r>
+            <a:r>
+              <a:rPr lang="en-US" sz="4400" b="0" i="0" kern="1200" dirty="0">
+                <a:solidFill>
+                  <a:schemeClr val="tx2"/>
+                </a:solidFill>
+                <a:latin typeface="+mj-lt"/>
+                <a:ea typeface="+mj-ea"/>
+                <a:cs typeface="+mj-cs"/>
+              </a:rPr>
+              <a:t> RDS</a:t>
+            </a:r>
+            <a:br>
+              <a:rPr lang="en-US" sz="5600" b="0" i="0" kern="1200" dirty="0">
+                <a:solidFill>
+                  <a:schemeClr val="tx2"/>
+                </a:solidFill>
+                <a:latin typeface="+mj-lt"/>
+                <a:ea typeface="+mj-ea"/>
+                <a:cs typeface="+mj-cs"/>
+              </a:rPr>
+            </a:br>
+            <a:endParaRPr lang="en-US" sz="5600" b="0" i="0" kern="1200" dirty="0">
+              <a:solidFill>
+                <a:schemeClr val="tx2"/>
+              </a:solidFill>
+              <a:latin typeface="+mj-lt"/>
+              <a:ea typeface="+mj-ea"/>
+              <a:cs typeface="+mj-cs"/>
+            </a:endParaRPr>
+          </a:p>
+        </p:txBody>
+      </p:sp>
+      <p:pic>
+        <p:nvPicPr>
+          <p:cNvPr id="11" name="Image 10">
+            <a:extLst>
+              <a:ext uri="{FF2B5EF4-FFF2-40B4-BE49-F238E27FC236}">
+                <a16:creationId xmlns:a16="http://schemas.microsoft.com/office/drawing/2014/main" id="{6FD23F9B-39B4-4AF0-AAE9-514FAA80AA8D}"/>
               </a:ext>
             </a:extLst>
           </p:cNvPr>
@@ -7699,88 +8073,80 @@
           <p:nvPr/>
         </p:nvPicPr>
         <p:blipFill>
-          <a:blip r:embed="rId2"/>
+          <a:blip r:embed="rId7"/>
           <a:stretch>
             <a:fillRect/>
           </a:stretch>
         </p:blipFill>
         <p:spPr>
           <a:xfrm>
-            <a:off x="496822" y="1671038"/>
-            <a:ext cx="6277201" cy="2238489"/>
+            <a:off x="761206" y="461085"/>
+            <a:ext cx="5127573" cy="6126327"/>
           </a:xfrm>
           <a:prstGeom prst="rect">
             <a:avLst/>
           </a:prstGeom>
+          <a:effectLst/>
         </p:spPr>
       </p:pic>
-      <p:pic>
-        <p:nvPicPr>
-          <p:cNvPr id="6" name="Image 5">
+      <p:sp>
+        <p:nvSpPr>
+          <p:cNvPr id="4" name="Espace réservé du numéro de diapositive 3">
             <a:extLst>
               <a:ext uri="{FF2B5EF4-FFF2-40B4-BE49-F238E27FC236}">
-                <a16:creationId xmlns:a16="http://schemas.microsoft.com/office/drawing/2014/main" id="{B3854A25-9ED7-4435-BB79-56CA03D915DD}"/>
+                <a16:creationId xmlns:a16="http://schemas.microsoft.com/office/drawing/2014/main" id="{CB5C9C78-38D6-4212-9E31-5DA00AA2DE89}"/>
               </a:ext>
             </a:extLst>
           </p:cNvPr>
-          <p:cNvPicPr/>
-          <p:nvPr/>
-        </p:nvPicPr>
-        <p:blipFill rotWithShape="1">
-          <a:blip r:embed="rId3"/>
-          <a:srcRect t="1" b="64351"/>
-          <a:stretch/>
-        </p:blipFill>
-        <p:spPr bwMode="auto">
-          <a:xfrm>
-            <a:off x="496822" y="4061143"/>
-            <a:ext cx="6277202" cy="1835804"/>
-          </a:xfrm>
-          <a:prstGeom prst="rect">
-            <a:avLst/>
-          </a:prstGeom>
-          <a:ln>
-            <a:noFill/>
-          </a:ln>
-          <a:extLst>
-            <a:ext uri="{53640926-AAD7-44D8-BBD7-CCE9431645EC}">
-              <a14:shadowObscured xmlns:a14="http://schemas.microsoft.com/office/drawing/2010/main"/>
-            </a:ext>
-          </a:extLst>
-        </p:spPr>
-      </p:pic>
-      <p:pic>
-        <p:nvPicPr>
-          <p:cNvPr id="7" name="Image 6">
-            <a:extLst>
-              <a:ext uri="{FF2B5EF4-FFF2-40B4-BE49-F238E27FC236}">
-                <a16:creationId xmlns:a16="http://schemas.microsoft.com/office/drawing/2014/main" id="{172F295E-2551-4502-AB48-07B64CAB3E10}"/>
-              </a:ext>
-            </a:extLst>
-          </p:cNvPr>
-          <p:cNvPicPr/>
-          <p:nvPr/>
-        </p:nvPicPr>
-        <p:blipFill>
-          <a:blip r:embed="rId4"/>
-          <a:stretch>
-            <a:fillRect/>
-          </a:stretch>
-        </p:blipFill>
-        <p:spPr>
-          <a:xfrm>
-            <a:off x="6885990" y="1503288"/>
-            <a:ext cx="5020153" cy="4475697"/>
-          </a:xfrm>
-          <a:prstGeom prst="rect">
-            <a:avLst/>
-          </a:prstGeom>
-        </p:spPr>
-      </p:pic>
+          <p:cNvSpPr>
+            <a:spLocks noGrp="1"/>
+          </p:cNvSpPr>
+          <p:nvPr>
+            <p:ph type="sldNum" sz="quarter" idx="12"/>
+          </p:nvPr>
+        </p:nvSpPr>
+        <p:spPr>
+          <a:xfrm>
+            <a:off x="10352540" y="295729"/>
+            <a:ext cx="838199" cy="767687"/>
+          </a:xfrm>
+        </p:spPr>
+        <p:txBody>
+          <a:bodyPr vert="horz" lIns="91440" tIns="45720" rIns="91440" bIns="45720" rtlCol="0" anchor="b">
+            <a:normAutofit/>
+          </a:bodyPr>
+          <a:lstStyle/>
+          <a:p>
+            <a:pPr defTabSz="914400">
+              <a:spcAft>
+                <a:spcPts val="600"/>
+              </a:spcAft>
+            </a:pPr>
+            <a:fld id="{D57F1E4F-1CFF-5643-939E-02111984F565}" type="slidenum">
+              <a:rPr lang="en-US">
+                <a:solidFill>
+                  <a:srgbClr val="FFFFFF"/>
+                </a:solidFill>
+              </a:rPr>
+              <a:pPr defTabSz="914400">
+                <a:spcAft>
+                  <a:spcPts val="600"/>
+                </a:spcAft>
+              </a:pPr>
+              <a:t>12</a:t>
+            </a:fld>
+            <a:endParaRPr lang="en-US">
+              <a:solidFill>
+                <a:srgbClr val="FFFFFF"/>
+              </a:solidFill>
+            </a:endParaRPr>
+          </a:p>
+        </p:txBody>
+      </p:sp>
     </p:spTree>
     <p:extLst>
       <p:ext uri="{BB962C8B-B14F-4D97-AF65-F5344CB8AC3E}">
-        <p14:creationId xmlns:p14="http://schemas.microsoft.com/office/powerpoint/2010/main" val="4223400114"/>
+        <p14:creationId xmlns:p14="http://schemas.microsoft.com/office/powerpoint/2010/main" val="266241088"/>
       </p:ext>
     </p:extLst>
   </p:cSld>
@@ -7825,7 +8191,7 @@
         </p:nvSpPr>
         <p:spPr>
           <a:xfrm>
-            <a:off x="755168" y="91241"/>
+            <a:off x="646111" y="452718"/>
             <a:ext cx="9404723" cy="767687"/>
           </a:xfrm>
         </p:spPr>
@@ -7872,10 +8238,10 @@
       </p:sp>
       <p:pic>
         <p:nvPicPr>
-          <p:cNvPr id="8" name="Image 7">
+          <p:cNvPr id="5" name="Image 4">
             <a:extLst>
               <a:ext uri="{FF2B5EF4-FFF2-40B4-BE49-F238E27FC236}">
-                <a16:creationId xmlns:a16="http://schemas.microsoft.com/office/drawing/2014/main" id="{90A94B65-B15D-40BE-A9EE-4FC4C7CAF16B}"/>
+                <a16:creationId xmlns:a16="http://schemas.microsoft.com/office/drawing/2014/main" id="{171A9683-561F-4F62-8E54-06FCFE6A630E}"/>
               </a:ext>
             </a:extLst>
           </p:cNvPr>
@@ -7890,8 +8256,8 @@
         </p:blipFill>
         <p:spPr>
           <a:xfrm>
-            <a:off x="646111" y="1730795"/>
-            <a:ext cx="5760720" cy="2593975"/>
+            <a:off x="496822" y="1671038"/>
+            <a:ext cx="6277201" cy="2238489"/>
           </a:xfrm>
           <a:prstGeom prst="rect">
             <a:avLst/>
@@ -7900,10 +8266,45 @@
       </p:pic>
       <p:pic>
         <p:nvPicPr>
-          <p:cNvPr id="9" name="Image 8">
+          <p:cNvPr id="6" name="Image 5">
             <a:extLst>
               <a:ext uri="{FF2B5EF4-FFF2-40B4-BE49-F238E27FC236}">
-                <a16:creationId xmlns:a16="http://schemas.microsoft.com/office/drawing/2014/main" id="{74BB29D2-1BC3-4588-AB26-D2E88A5B6A4A}"/>
+                <a16:creationId xmlns:a16="http://schemas.microsoft.com/office/drawing/2014/main" id="{B3854A25-9ED7-4435-BB79-56CA03D915DD}"/>
+              </a:ext>
+            </a:extLst>
+          </p:cNvPr>
+          <p:cNvPicPr/>
+          <p:nvPr/>
+        </p:nvPicPr>
+        <p:blipFill rotWithShape="1">
+          <a:blip r:embed="rId3"/>
+          <a:srcRect t="1" b="64351"/>
+          <a:stretch/>
+        </p:blipFill>
+        <p:spPr bwMode="auto">
+          <a:xfrm>
+            <a:off x="496822" y="4061143"/>
+            <a:ext cx="6277202" cy="1835804"/>
+          </a:xfrm>
+          <a:prstGeom prst="rect">
+            <a:avLst/>
+          </a:prstGeom>
+          <a:ln>
+            <a:noFill/>
+          </a:ln>
+          <a:extLst>
+            <a:ext uri="{53640926-AAD7-44D8-BBD7-CCE9431645EC}">
+              <a14:shadowObscured xmlns:a14="http://schemas.microsoft.com/office/drawing/2010/main"/>
+            </a:ext>
+          </a:extLst>
+        </p:spPr>
+      </p:pic>
+      <p:pic>
+        <p:nvPicPr>
+          <p:cNvPr id="7" name="Image 6">
+            <a:extLst>
+              <a:ext uri="{FF2B5EF4-FFF2-40B4-BE49-F238E27FC236}">
+                <a16:creationId xmlns:a16="http://schemas.microsoft.com/office/drawing/2014/main" id="{172F295E-2551-4502-AB48-07B64CAB3E10}"/>
               </a:ext>
             </a:extLst>
           </p:cNvPr>
@@ -7911,457 +8312,25 @@
           <p:nvPr/>
         </p:nvPicPr>
         <p:blipFill>
-          <a:blip r:embed="rId3"/>
+          <a:blip r:embed="rId4"/>
           <a:stretch>
             <a:fillRect/>
           </a:stretch>
         </p:blipFill>
         <p:spPr>
           <a:xfrm>
-            <a:off x="545442" y="5059033"/>
-            <a:ext cx="6157361" cy="1158705"/>
+            <a:off x="6885990" y="1503288"/>
+            <a:ext cx="5020153" cy="4475697"/>
           </a:xfrm>
           <a:prstGeom prst="rect">
             <a:avLst/>
           </a:prstGeom>
-        </p:spPr>
-      </p:pic>
-      <p:sp>
-        <p:nvSpPr>
-          <p:cNvPr id="3" name="Rectangle 2">
-            <a:extLst>
-              <a:ext uri="{FF2B5EF4-FFF2-40B4-BE49-F238E27FC236}">
-                <a16:creationId xmlns:a16="http://schemas.microsoft.com/office/drawing/2014/main" id="{F506A4C4-D8C6-4FED-8556-8D7BA668B040}"/>
-              </a:ext>
-            </a:extLst>
-          </p:cNvPr>
-          <p:cNvSpPr/>
-          <p:nvPr/>
-        </p:nvSpPr>
-        <p:spPr>
-          <a:xfrm>
-            <a:off x="646111" y="1730796"/>
-            <a:ext cx="5760720" cy="218114"/>
-          </a:xfrm>
-          <a:prstGeom prst="rect">
-            <a:avLst/>
-          </a:prstGeom>
-          <a:noFill/>
-        </p:spPr>
-        <p:style>
-          <a:lnRef idx="2">
-            <a:schemeClr val="accent1">
-              <a:shade val="50000"/>
-            </a:schemeClr>
-          </a:lnRef>
-          <a:fillRef idx="1">
-            <a:schemeClr val="accent1"/>
-          </a:fillRef>
-          <a:effectRef idx="0">
-            <a:schemeClr val="accent1"/>
-          </a:effectRef>
-          <a:fontRef idx="minor">
-            <a:schemeClr val="lt1"/>
-          </a:fontRef>
-        </p:style>
-        <p:txBody>
-          <a:bodyPr rtlCol="0" anchor="ctr"/>
-          <a:lstStyle/>
-          <a:p>
-            <a:pPr algn="ctr"/>
-            <a:endParaRPr lang="fr-FR"/>
-          </a:p>
-        </p:txBody>
-      </p:sp>
-      <p:sp>
-        <p:nvSpPr>
-          <p:cNvPr id="10" name="Rectangle 9">
-            <a:extLst>
-              <a:ext uri="{FF2B5EF4-FFF2-40B4-BE49-F238E27FC236}">
-                <a16:creationId xmlns:a16="http://schemas.microsoft.com/office/drawing/2014/main" id="{1887DAF8-81F8-42A5-B3A4-B4FAE440E1E6}"/>
-              </a:ext>
-            </a:extLst>
-          </p:cNvPr>
-          <p:cNvSpPr/>
-          <p:nvPr/>
-        </p:nvSpPr>
-        <p:spPr>
-          <a:xfrm>
-            <a:off x="646111" y="3926048"/>
-            <a:ext cx="5760720" cy="155064"/>
-          </a:xfrm>
-          <a:prstGeom prst="rect">
-            <a:avLst/>
-          </a:prstGeom>
-          <a:noFill/>
-        </p:spPr>
-        <p:style>
-          <a:lnRef idx="2">
-            <a:schemeClr val="accent1">
-              <a:shade val="50000"/>
-            </a:schemeClr>
-          </a:lnRef>
-          <a:fillRef idx="1">
-            <a:schemeClr val="accent1"/>
-          </a:fillRef>
-          <a:effectRef idx="0">
-            <a:schemeClr val="accent1"/>
-          </a:effectRef>
-          <a:fontRef idx="minor">
-            <a:schemeClr val="lt1"/>
-          </a:fontRef>
-        </p:style>
-        <p:txBody>
-          <a:bodyPr rtlCol="0" anchor="ctr"/>
-          <a:lstStyle/>
-          <a:p>
-            <a:pPr algn="ctr"/>
-            <a:endParaRPr lang="fr-FR"/>
-          </a:p>
-        </p:txBody>
-      </p:sp>
-      <p:sp>
-        <p:nvSpPr>
-          <p:cNvPr id="11" name="Rectangle 10">
-            <a:extLst>
-              <a:ext uri="{FF2B5EF4-FFF2-40B4-BE49-F238E27FC236}">
-                <a16:creationId xmlns:a16="http://schemas.microsoft.com/office/drawing/2014/main" id="{66C6C7FE-035D-44DF-B52E-7F7E038C91A1}"/>
-              </a:ext>
-            </a:extLst>
-          </p:cNvPr>
-          <p:cNvSpPr/>
-          <p:nvPr/>
-        </p:nvSpPr>
-        <p:spPr>
-          <a:xfrm>
-            <a:off x="4102217" y="5059033"/>
-            <a:ext cx="2422060" cy="155064"/>
-          </a:xfrm>
-          <a:prstGeom prst="rect">
-            <a:avLst/>
-          </a:prstGeom>
-          <a:noFill/>
-        </p:spPr>
-        <p:style>
-          <a:lnRef idx="2">
-            <a:schemeClr val="accent1">
-              <a:shade val="50000"/>
-            </a:schemeClr>
-          </a:lnRef>
-          <a:fillRef idx="1">
-            <a:schemeClr val="accent1"/>
-          </a:fillRef>
-          <a:effectRef idx="0">
-            <a:schemeClr val="accent1"/>
-          </a:effectRef>
-          <a:fontRef idx="minor">
-            <a:schemeClr val="lt1"/>
-          </a:fontRef>
-        </p:style>
-        <p:txBody>
-          <a:bodyPr rtlCol="0" anchor="ctr"/>
-          <a:lstStyle/>
-          <a:p>
-            <a:pPr algn="ctr"/>
-            <a:endParaRPr lang="fr-FR"/>
-          </a:p>
-        </p:txBody>
-      </p:sp>
-      <p:sp>
-        <p:nvSpPr>
-          <p:cNvPr id="13" name="ZoneTexte 12">
-            <a:extLst>
-              <a:ext uri="{FF2B5EF4-FFF2-40B4-BE49-F238E27FC236}">
-                <a16:creationId xmlns:a16="http://schemas.microsoft.com/office/drawing/2014/main" id="{9D019F64-FB14-4A50-B41F-0E1F7FBF3581}"/>
-              </a:ext>
-            </a:extLst>
-          </p:cNvPr>
-          <p:cNvSpPr txBox="1"/>
-          <p:nvPr/>
-        </p:nvSpPr>
-        <p:spPr>
-          <a:xfrm>
-            <a:off x="1795244" y="1219614"/>
-            <a:ext cx="2885813" cy="369332"/>
-          </a:xfrm>
-          <a:prstGeom prst="rect">
-            <a:avLst/>
-          </a:prstGeom>
-          <a:noFill/>
-        </p:spPr>
-        <p:txBody>
-          <a:bodyPr wrap="square" rtlCol="0">
-            <a:spAutoFit/>
-          </a:bodyPr>
-          <a:lstStyle/>
-          <a:p>
-            <a:pPr algn="ctr"/>
-            <a:r>
-              <a:rPr lang="fr-FR" dirty="0"/>
-              <a:t>Clone du projet</a:t>
-            </a:r>
-          </a:p>
-        </p:txBody>
-      </p:sp>
-      <p:sp>
-        <p:nvSpPr>
-          <p:cNvPr id="14" name="ZoneTexte 13">
-            <a:extLst>
-              <a:ext uri="{FF2B5EF4-FFF2-40B4-BE49-F238E27FC236}">
-                <a16:creationId xmlns:a16="http://schemas.microsoft.com/office/drawing/2014/main" id="{42203BCE-A41F-4CDD-8765-B3846154753C}"/>
-              </a:ext>
-            </a:extLst>
-          </p:cNvPr>
-          <p:cNvSpPr txBox="1"/>
-          <p:nvPr/>
-        </p:nvSpPr>
-        <p:spPr>
-          <a:xfrm>
-            <a:off x="1795243" y="4630709"/>
-            <a:ext cx="2885813" cy="369332"/>
-          </a:xfrm>
-          <a:prstGeom prst="rect">
-            <a:avLst/>
-          </a:prstGeom>
-          <a:noFill/>
-        </p:spPr>
-        <p:txBody>
-          <a:bodyPr wrap="square" rtlCol="0">
-            <a:spAutoFit/>
-          </a:bodyPr>
-          <a:lstStyle/>
-          <a:p>
-            <a:pPr algn="ctr"/>
-            <a:r>
-              <a:rPr lang="fr-FR" dirty="0"/>
-              <a:t>Run du serveur </a:t>
-            </a:r>
-            <a:r>
-              <a:rPr lang="fr-FR" dirty="0" err="1"/>
-              <a:t>django</a:t>
-            </a:r>
-            <a:endParaRPr lang="fr-FR" dirty="0"/>
-          </a:p>
-        </p:txBody>
-      </p:sp>
-      <p:sp>
-        <p:nvSpPr>
-          <p:cNvPr id="15" name="ZoneTexte 14">
-            <a:extLst>
-              <a:ext uri="{FF2B5EF4-FFF2-40B4-BE49-F238E27FC236}">
-                <a16:creationId xmlns:a16="http://schemas.microsoft.com/office/drawing/2014/main" id="{30E8C31B-0BF0-470B-BAD4-0E6C5002B9BC}"/>
-              </a:ext>
-            </a:extLst>
-          </p:cNvPr>
-          <p:cNvSpPr txBox="1"/>
-          <p:nvPr/>
-        </p:nvSpPr>
-        <p:spPr>
-          <a:xfrm>
-            <a:off x="7743039" y="2847442"/>
-            <a:ext cx="4043494" cy="1477328"/>
-          </a:xfrm>
-          <a:prstGeom prst="rect">
-            <a:avLst/>
-          </a:prstGeom>
-          <a:noFill/>
-        </p:spPr>
-        <p:txBody>
-          <a:bodyPr wrap="square" rtlCol="0">
-            <a:spAutoFit/>
-          </a:bodyPr>
-          <a:lstStyle/>
-          <a:p>
-            <a:r>
-              <a:rPr lang="fr-FR" b="1" dirty="0"/>
-              <a:t>Installation des package:</a:t>
-            </a:r>
-          </a:p>
-          <a:p>
-            <a:pPr lvl="0"/>
-            <a:r>
-              <a:rPr lang="fr-FR" dirty="0"/>
-              <a:t>- </a:t>
-            </a:r>
-            <a:r>
-              <a:rPr lang="fr-FR" dirty="0" err="1"/>
-              <a:t>sudo</a:t>
-            </a:r>
-            <a:r>
-              <a:rPr lang="fr-FR" dirty="0"/>
-              <a:t> </a:t>
-            </a:r>
-            <a:r>
-              <a:rPr lang="fr-FR" dirty="0" err="1"/>
-              <a:t>apt</a:t>
-            </a:r>
-            <a:r>
-              <a:rPr lang="fr-FR" dirty="0"/>
-              <a:t> update </a:t>
-            </a:r>
-          </a:p>
-          <a:p>
-            <a:pPr lvl="0"/>
-            <a:r>
-              <a:rPr lang="fr-FR" dirty="0"/>
-              <a:t>- </a:t>
-            </a:r>
-            <a:r>
-              <a:rPr lang="fr-FR" dirty="0" err="1"/>
-              <a:t>sudo</a:t>
-            </a:r>
-            <a:r>
-              <a:rPr lang="fr-FR" dirty="0"/>
-              <a:t> </a:t>
-            </a:r>
-            <a:r>
-              <a:rPr lang="fr-FR" dirty="0" err="1"/>
-              <a:t>apt</a:t>
-            </a:r>
-            <a:r>
-              <a:rPr lang="fr-FR" dirty="0"/>
-              <a:t> </a:t>
-            </a:r>
-            <a:r>
-              <a:rPr lang="fr-FR" dirty="0" err="1"/>
-              <a:t>install</a:t>
-            </a:r>
-            <a:r>
-              <a:rPr lang="fr-FR" dirty="0"/>
-              <a:t> python3-pip </a:t>
-            </a:r>
-          </a:p>
-          <a:p>
-            <a:pPr lvl="0"/>
-            <a:r>
-              <a:rPr lang="fr-FR" dirty="0"/>
-              <a:t>- pip3 </a:t>
-            </a:r>
-            <a:r>
-              <a:rPr lang="fr-FR" dirty="0" err="1"/>
-              <a:t>install</a:t>
-            </a:r>
-            <a:r>
-              <a:rPr lang="fr-FR" dirty="0"/>
-              <a:t> </a:t>
-            </a:r>
-            <a:r>
-              <a:rPr lang="fr-FR" dirty="0" err="1"/>
-              <a:t>django</a:t>
-            </a:r>
-            <a:r>
-              <a:rPr lang="fr-FR" dirty="0"/>
-              <a:t> </a:t>
-            </a:r>
-            <a:r>
-              <a:rPr lang="fr-FR" dirty="0" err="1"/>
-              <a:t>requests</a:t>
-            </a:r>
-            <a:endParaRPr lang="fr-FR" dirty="0"/>
-          </a:p>
-          <a:p>
-            <a:endParaRPr lang="fr-FR" dirty="0"/>
-          </a:p>
-        </p:txBody>
-      </p:sp>
-      <p:sp>
-        <p:nvSpPr>
-          <p:cNvPr id="16" name="Rectangle 15">
-            <a:extLst>
-              <a:ext uri="{FF2B5EF4-FFF2-40B4-BE49-F238E27FC236}">
-                <a16:creationId xmlns:a16="http://schemas.microsoft.com/office/drawing/2014/main" id="{0B4957D2-CE5E-4B62-9933-807CE11F5A03}"/>
-              </a:ext>
-            </a:extLst>
-          </p:cNvPr>
-          <p:cNvSpPr/>
-          <p:nvPr/>
-        </p:nvSpPr>
-        <p:spPr>
-          <a:xfrm>
-            <a:off x="545442" y="5903186"/>
-            <a:ext cx="2981029" cy="155064"/>
-          </a:xfrm>
-          <a:prstGeom prst="rect">
-            <a:avLst/>
-          </a:prstGeom>
-          <a:noFill/>
-        </p:spPr>
-        <p:style>
-          <a:lnRef idx="2">
-            <a:schemeClr val="accent1">
-              <a:shade val="50000"/>
-            </a:schemeClr>
-          </a:lnRef>
-          <a:fillRef idx="1">
-            <a:schemeClr val="accent1"/>
-          </a:fillRef>
-          <a:effectRef idx="0">
-            <a:schemeClr val="accent1"/>
-          </a:effectRef>
-          <a:fontRef idx="minor">
-            <a:schemeClr val="lt1"/>
-          </a:fontRef>
-        </p:style>
-        <p:txBody>
-          <a:bodyPr rtlCol="0" anchor="ctr"/>
-          <a:lstStyle/>
-          <a:p>
-            <a:pPr algn="ctr"/>
-            <a:endParaRPr lang="fr-FR"/>
-          </a:p>
-        </p:txBody>
-      </p:sp>
-      <p:pic>
-        <p:nvPicPr>
-          <p:cNvPr id="17" name="Picture 2" descr="Résultat de recherche d'images pour &quot;logo github&quot;">
-            <a:extLst>
-              <a:ext uri="{FF2B5EF4-FFF2-40B4-BE49-F238E27FC236}">
-                <a16:creationId xmlns:a16="http://schemas.microsoft.com/office/drawing/2014/main" id="{7B5BC76A-1698-4AEA-B233-EDB4AAD37F05}"/>
-              </a:ext>
-            </a:extLst>
-          </p:cNvPr>
-          <p:cNvPicPr>
-            <a:picLocks noChangeAspect="1" noChangeArrowheads="1"/>
-          </p:cNvPicPr>
-          <p:nvPr/>
-        </p:nvPicPr>
-        <p:blipFill>
-          <a:blip r:embed="rId4">
-            <a:extLst>
-              <a:ext uri="{28A0092B-C50C-407E-A947-70E740481C1C}">
-                <a14:useLocalDpi xmlns:a14="http://schemas.microsoft.com/office/drawing/2010/main" val="0"/>
-              </a:ext>
-            </a:extLst>
-          </a:blip>
-          <a:srcRect/>
-          <a:stretch>
-            <a:fillRect/>
-          </a:stretch>
-        </p:blipFill>
-        <p:spPr bwMode="auto">
-          <a:xfrm>
-            <a:off x="8651969" y="1404280"/>
-            <a:ext cx="1198239" cy="1082248"/>
-          </a:xfrm>
-          <a:prstGeom prst="rect">
-            <a:avLst/>
-          </a:prstGeom>
-          <a:noFill/>
-          <a:extLst>
-            <a:ext uri="{909E8E84-426E-40DD-AFC4-6F175D3DCCD1}">
-              <a14:hiddenFill xmlns:a14="http://schemas.microsoft.com/office/drawing/2010/main">
-                <a:solidFill>
-                  <a:srgbClr val="FFFFFF"/>
-                </a:solidFill>
-              </a14:hiddenFill>
-            </a:ext>
-          </a:extLst>
         </p:spPr>
       </p:pic>
     </p:spTree>
     <p:extLst>
       <p:ext uri="{BB962C8B-B14F-4D97-AF65-F5344CB8AC3E}">
-        <p14:creationId xmlns:p14="http://schemas.microsoft.com/office/powerpoint/2010/main" val="601440326"/>
+        <p14:creationId xmlns:p14="http://schemas.microsoft.com/office/powerpoint/2010/main" val="4223400114"/>
       </p:ext>
     </p:extLst>
   </p:cSld>
@@ -8406,7 +8375,7 @@
         </p:nvSpPr>
         <p:spPr>
           <a:xfrm>
-            <a:off x="646111" y="452718"/>
+            <a:off x="755168" y="91241"/>
             <a:ext cx="9404723" cy="767687"/>
           </a:xfrm>
         </p:spPr>
@@ -8417,7 +8386,7 @@
             <a:pPr algn="ctr"/>
             <a:r>
               <a:rPr lang="fr-FR" sz="3600" dirty="0"/>
-              <a:t>Machine 2 – EC2</a:t>
+              <a:t>Machine 1 – EC2</a:t>
             </a:r>
           </a:p>
         </p:txBody>
@@ -8453,10 +8422,10 @@
       </p:sp>
       <p:pic>
         <p:nvPicPr>
-          <p:cNvPr id="9" name="Image 8">
+          <p:cNvPr id="8" name="Image 7">
             <a:extLst>
               <a:ext uri="{FF2B5EF4-FFF2-40B4-BE49-F238E27FC236}">
-                <a16:creationId xmlns:a16="http://schemas.microsoft.com/office/drawing/2014/main" id="{7E1922B4-816C-45A3-A8FF-68D1EB2F1E4D}"/>
+                <a16:creationId xmlns:a16="http://schemas.microsoft.com/office/drawing/2014/main" id="{90A94B65-B15D-40BE-A9EE-4FC4C7CAF16B}"/>
               </a:ext>
             </a:extLst>
           </p:cNvPr>
@@ -8471,18 +8440,478 @@
         </p:blipFill>
         <p:spPr>
           <a:xfrm>
-            <a:off x="1583769" y="1220405"/>
-            <a:ext cx="8467065" cy="5237503"/>
+            <a:off x="646111" y="1730795"/>
+            <a:ext cx="5760720" cy="2593975"/>
           </a:xfrm>
           <a:prstGeom prst="rect">
             <a:avLst/>
           </a:prstGeom>
+        </p:spPr>
+      </p:pic>
+      <p:pic>
+        <p:nvPicPr>
+          <p:cNvPr id="9" name="Image 8">
+            <a:extLst>
+              <a:ext uri="{FF2B5EF4-FFF2-40B4-BE49-F238E27FC236}">
+                <a16:creationId xmlns:a16="http://schemas.microsoft.com/office/drawing/2014/main" id="{74BB29D2-1BC3-4588-AB26-D2E88A5B6A4A}"/>
+              </a:ext>
+            </a:extLst>
+          </p:cNvPr>
+          <p:cNvPicPr/>
+          <p:nvPr/>
+        </p:nvPicPr>
+        <p:blipFill>
+          <a:blip r:embed="rId3"/>
+          <a:stretch>
+            <a:fillRect/>
+          </a:stretch>
+        </p:blipFill>
+        <p:spPr>
+          <a:xfrm>
+            <a:off x="545442" y="5059033"/>
+            <a:ext cx="6157361" cy="1158705"/>
+          </a:xfrm>
+          <a:prstGeom prst="rect">
+            <a:avLst/>
+          </a:prstGeom>
+        </p:spPr>
+      </p:pic>
+      <p:sp>
+        <p:nvSpPr>
+          <p:cNvPr id="3" name="Rectangle 2">
+            <a:extLst>
+              <a:ext uri="{FF2B5EF4-FFF2-40B4-BE49-F238E27FC236}">
+                <a16:creationId xmlns:a16="http://schemas.microsoft.com/office/drawing/2014/main" id="{F506A4C4-D8C6-4FED-8556-8D7BA668B040}"/>
+              </a:ext>
+            </a:extLst>
+          </p:cNvPr>
+          <p:cNvSpPr/>
+          <p:nvPr/>
+        </p:nvSpPr>
+        <p:spPr>
+          <a:xfrm>
+            <a:off x="646111" y="1730796"/>
+            <a:ext cx="5760720" cy="218114"/>
+          </a:xfrm>
+          <a:prstGeom prst="rect">
+            <a:avLst/>
+          </a:prstGeom>
+          <a:noFill/>
+        </p:spPr>
+        <p:style>
+          <a:lnRef idx="2">
+            <a:schemeClr val="accent1">
+              <a:shade val="50000"/>
+            </a:schemeClr>
+          </a:lnRef>
+          <a:fillRef idx="1">
+            <a:schemeClr val="accent1"/>
+          </a:fillRef>
+          <a:effectRef idx="0">
+            <a:schemeClr val="accent1"/>
+          </a:effectRef>
+          <a:fontRef idx="minor">
+            <a:schemeClr val="lt1"/>
+          </a:fontRef>
+        </p:style>
+        <p:txBody>
+          <a:bodyPr rtlCol="0" anchor="ctr"/>
+          <a:lstStyle/>
+          <a:p>
+            <a:pPr algn="ctr"/>
+            <a:endParaRPr lang="fr-FR"/>
+          </a:p>
+        </p:txBody>
+      </p:sp>
+      <p:sp>
+        <p:nvSpPr>
+          <p:cNvPr id="10" name="Rectangle 9">
+            <a:extLst>
+              <a:ext uri="{FF2B5EF4-FFF2-40B4-BE49-F238E27FC236}">
+                <a16:creationId xmlns:a16="http://schemas.microsoft.com/office/drawing/2014/main" id="{1887DAF8-81F8-42A5-B3A4-B4FAE440E1E6}"/>
+              </a:ext>
+            </a:extLst>
+          </p:cNvPr>
+          <p:cNvSpPr/>
+          <p:nvPr/>
+        </p:nvSpPr>
+        <p:spPr>
+          <a:xfrm>
+            <a:off x="646111" y="3926048"/>
+            <a:ext cx="5760720" cy="155064"/>
+          </a:xfrm>
+          <a:prstGeom prst="rect">
+            <a:avLst/>
+          </a:prstGeom>
+          <a:noFill/>
+        </p:spPr>
+        <p:style>
+          <a:lnRef idx="2">
+            <a:schemeClr val="accent1">
+              <a:shade val="50000"/>
+            </a:schemeClr>
+          </a:lnRef>
+          <a:fillRef idx="1">
+            <a:schemeClr val="accent1"/>
+          </a:fillRef>
+          <a:effectRef idx="0">
+            <a:schemeClr val="accent1"/>
+          </a:effectRef>
+          <a:fontRef idx="minor">
+            <a:schemeClr val="lt1"/>
+          </a:fontRef>
+        </p:style>
+        <p:txBody>
+          <a:bodyPr rtlCol="0" anchor="ctr"/>
+          <a:lstStyle/>
+          <a:p>
+            <a:pPr algn="ctr"/>
+            <a:endParaRPr lang="fr-FR"/>
+          </a:p>
+        </p:txBody>
+      </p:sp>
+      <p:sp>
+        <p:nvSpPr>
+          <p:cNvPr id="11" name="Rectangle 10">
+            <a:extLst>
+              <a:ext uri="{FF2B5EF4-FFF2-40B4-BE49-F238E27FC236}">
+                <a16:creationId xmlns:a16="http://schemas.microsoft.com/office/drawing/2014/main" id="{66C6C7FE-035D-44DF-B52E-7F7E038C91A1}"/>
+              </a:ext>
+            </a:extLst>
+          </p:cNvPr>
+          <p:cNvSpPr/>
+          <p:nvPr/>
+        </p:nvSpPr>
+        <p:spPr>
+          <a:xfrm>
+            <a:off x="4102217" y="5059033"/>
+            <a:ext cx="2422060" cy="155064"/>
+          </a:xfrm>
+          <a:prstGeom prst="rect">
+            <a:avLst/>
+          </a:prstGeom>
+          <a:noFill/>
+        </p:spPr>
+        <p:style>
+          <a:lnRef idx="2">
+            <a:schemeClr val="accent1">
+              <a:shade val="50000"/>
+            </a:schemeClr>
+          </a:lnRef>
+          <a:fillRef idx="1">
+            <a:schemeClr val="accent1"/>
+          </a:fillRef>
+          <a:effectRef idx="0">
+            <a:schemeClr val="accent1"/>
+          </a:effectRef>
+          <a:fontRef idx="minor">
+            <a:schemeClr val="lt1"/>
+          </a:fontRef>
+        </p:style>
+        <p:txBody>
+          <a:bodyPr rtlCol="0" anchor="ctr"/>
+          <a:lstStyle/>
+          <a:p>
+            <a:pPr algn="ctr"/>
+            <a:endParaRPr lang="fr-FR"/>
+          </a:p>
+        </p:txBody>
+      </p:sp>
+      <p:sp>
+        <p:nvSpPr>
+          <p:cNvPr id="13" name="ZoneTexte 12">
+            <a:extLst>
+              <a:ext uri="{FF2B5EF4-FFF2-40B4-BE49-F238E27FC236}">
+                <a16:creationId xmlns:a16="http://schemas.microsoft.com/office/drawing/2014/main" id="{9D019F64-FB14-4A50-B41F-0E1F7FBF3581}"/>
+              </a:ext>
+            </a:extLst>
+          </p:cNvPr>
+          <p:cNvSpPr txBox="1"/>
+          <p:nvPr/>
+        </p:nvSpPr>
+        <p:spPr>
+          <a:xfrm>
+            <a:off x="1795244" y="1219614"/>
+            <a:ext cx="2885813" cy="369332"/>
+          </a:xfrm>
+          <a:prstGeom prst="rect">
+            <a:avLst/>
+          </a:prstGeom>
+          <a:noFill/>
+        </p:spPr>
+        <p:txBody>
+          <a:bodyPr wrap="square" rtlCol="0">
+            <a:spAutoFit/>
+          </a:bodyPr>
+          <a:lstStyle/>
+          <a:p>
+            <a:pPr algn="ctr"/>
+            <a:r>
+              <a:rPr lang="fr-FR" dirty="0"/>
+              <a:t>Clone du projet</a:t>
+            </a:r>
+          </a:p>
+        </p:txBody>
+      </p:sp>
+      <p:sp>
+        <p:nvSpPr>
+          <p:cNvPr id="14" name="ZoneTexte 13">
+            <a:extLst>
+              <a:ext uri="{FF2B5EF4-FFF2-40B4-BE49-F238E27FC236}">
+                <a16:creationId xmlns:a16="http://schemas.microsoft.com/office/drawing/2014/main" id="{42203BCE-A41F-4CDD-8765-B3846154753C}"/>
+              </a:ext>
+            </a:extLst>
+          </p:cNvPr>
+          <p:cNvSpPr txBox="1"/>
+          <p:nvPr/>
+        </p:nvSpPr>
+        <p:spPr>
+          <a:xfrm>
+            <a:off x="1795243" y="4630709"/>
+            <a:ext cx="2885813" cy="369332"/>
+          </a:xfrm>
+          <a:prstGeom prst="rect">
+            <a:avLst/>
+          </a:prstGeom>
+          <a:noFill/>
+        </p:spPr>
+        <p:txBody>
+          <a:bodyPr wrap="square" rtlCol="0">
+            <a:spAutoFit/>
+          </a:bodyPr>
+          <a:lstStyle/>
+          <a:p>
+            <a:pPr algn="ctr"/>
+            <a:r>
+              <a:rPr lang="fr-FR" dirty="0"/>
+              <a:t>Run du serveur </a:t>
+            </a:r>
+            <a:r>
+              <a:rPr lang="fr-FR" dirty="0" err="1"/>
+              <a:t>django</a:t>
+            </a:r>
+            <a:endParaRPr lang="fr-FR" dirty="0"/>
+          </a:p>
+        </p:txBody>
+      </p:sp>
+      <p:sp>
+        <p:nvSpPr>
+          <p:cNvPr id="15" name="ZoneTexte 14">
+            <a:extLst>
+              <a:ext uri="{FF2B5EF4-FFF2-40B4-BE49-F238E27FC236}">
+                <a16:creationId xmlns:a16="http://schemas.microsoft.com/office/drawing/2014/main" id="{30E8C31B-0BF0-470B-BAD4-0E6C5002B9BC}"/>
+              </a:ext>
+            </a:extLst>
+          </p:cNvPr>
+          <p:cNvSpPr txBox="1"/>
+          <p:nvPr/>
+        </p:nvSpPr>
+        <p:spPr>
+          <a:xfrm>
+            <a:off x="7743039" y="2847442"/>
+            <a:ext cx="4043494" cy="1477328"/>
+          </a:xfrm>
+          <a:prstGeom prst="rect">
+            <a:avLst/>
+          </a:prstGeom>
+          <a:noFill/>
+        </p:spPr>
+        <p:txBody>
+          <a:bodyPr wrap="square" rtlCol="0">
+            <a:spAutoFit/>
+          </a:bodyPr>
+          <a:lstStyle/>
+          <a:p>
+            <a:r>
+              <a:rPr lang="fr-FR" b="1" dirty="0"/>
+              <a:t>Installation des package:</a:t>
+            </a:r>
+          </a:p>
+          <a:p>
+            <a:pPr lvl="0"/>
+            <a:r>
+              <a:rPr lang="fr-FR" dirty="0"/>
+              <a:t>- </a:t>
+            </a:r>
+            <a:r>
+              <a:rPr lang="fr-FR" dirty="0" err="1"/>
+              <a:t>sudo</a:t>
+            </a:r>
+            <a:r>
+              <a:rPr lang="fr-FR" dirty="0"/>
+              <a:t> </a:t>
+            </a:r>
+            <a:r>
+              <a:rPr lang="fr-FR" dirty="0" err="1"/>
+              <a:t>apt</a:t>
+            </a:r>
+            <a:r>
+              <a:rPr lang="fr-FR" dirty="0"/>
+              <a:t> update </a:t>
+            </a:r>
+          </a:p>
+          <a:p>
+            <a:pPr lvl="0"/>
+            <a:r>
+              <a:rPr lang="fr-FR" dirty="0"/>
+              <a:t>- </a:t>
+            </a:r>
+            <a:r>
+              <a:rPr lang="fr-FR" dirty="0" err="1"/>
+              <a:t>sudo</a:t>
+            </a:r>
+            <a:r>
+              <a:rPr lang="fr-FR" dirty="0"/>
+              <a:t> </a:t>
+            </a:r>
+            <a:r>
+              <a:rPr lang="fr-FR" dirty="0" err="1"/>
+              <a:t>apt</a:t>
+            </a:r>
+            <a:r>
+              <a:rPr lang="fr-FR" dirty="0"/>
+              <a:t> </a:t>
+            </a:r>
+            <a:r>
+              <a:rPr lang="fr-FR" dirty="0" err="1"/>
+              <a:t>install</a:t>
+            </a:r>
+            <a:r>
+              <a:rPr lang="fr-FR" dirty="0"/>
+              <a:t> python3-pip </a:t>
+            </a:r>
+          </a:p>
+          <a:p>
+            <a:pPr lvl="0"/>
+            <a:r>
+              <a:rPr lang="fr-FR" dirty="0"/>
+              <a:t>- pip3 </a:t>
+            </a:r>
+            <a:r>
+              <a:rPr lang="fr-FR" dirty="0" err="1"/>
+              <a:t>install</a:t>
+            </a:r>
+            <a:r>
+              <a:rPr lang="fr-FR" dirty="0"/>
+              <a:t> </a:t>
+            </a:r>
+            <a:r>
+              <a:rPr lang="fr-FR" dirty="0" err="1"/>
+              <a:t>django</a:t>
+            </a:r>
+            <a:r>
+              <a:rPr lang="fr-FR" dirty="0"/>
+              <a:t> </a:t>
+            </a:r>
+            <a:r>
+              <a:rPr lang="fr-FR" dirty="0" err="1"/>
+              <a:t>requests</a:t>
+            </a:r>
+            <a:endParaRPr lang="fr-FR" dirty="0"/>
+          </a:p>
+          <a:p>
+            <a:endParaRPr lang="fr-FR" dirty="0"/>
+          </a:p>
+        </p:txBody>
+      </p:sp>
+      <p:sp>
+        <p:nvSpPr>
+          <p:cNvPr id="16" name="Rectangle 15">
+            <a:extLst>
+              <a:ext uri="{FF2B5EF4-FFF2-40B4-BE49-F238E27FC236}">
+                <a16:creationId xmlns:a16="http://schemas.microsoft.com/office/drawing/2014/main" id="{0B4957D2-CE5E-4B62-9933-807CE11F5A03}"/>
+              </a:ext>
+            </a:extLst>
+          </p:cNvPr>
+          <p:cNvSpPr/>
+          <p:nvPr/>
+        </p:nvSpPr>
+        <p:spPr>
+          <a:xfrm>
+            <a:off x="545442" y="5903186"/>
+            <a:ext cx="2981029" cy="155064"/>
+          </a:xfrm>
+          <a:prstGeom prst="rect">
+            <a:avLst/>
+          </a:prstGeom>
+          <a:noFill/>
+        </p:spPr>
+        <p:style>
+          <a:lnRef idx="2">
+            <a:schemeClr val="accent1">
+              <a:shade val="50000"/>
+            </a:schemeClr>
+          </a:lnRef>
+          <a:fillRef idx="1">
+            <a:schemeClr val="accent1"/>
+          </a:fillRef>
+          <a:effectRef idx="0">
+            <a:schemeClr val="accent1"/>
+          </a:effectRef>
+          <a:fontRef idx="minor">
+            <a:schemeClr val="lt1"/>
+          </a:fontRef>
+        </p:style>
+        <p:txBody>
+          <a:bodyPr rtlCol="0" anchor="ctr"/>
+          <a:lstStyle/>
+          <a:p>
+            <a:pPr algn="ctr"/>
+            <a:endParaRPr lang="fr-FR"/>
+          </a:p>
+        </p:txBody>
+      </p:sp>
+      <p:pic>
+        <p:nvPicPr>
+          <p:cNvPr id="17" name="Picture 2" descr="Résultat de recherche d'images pour &quot;logo github&quot;">
+            <a:extLst>
+              <a:ext uri="{FF2B5EF4-FFF2-40B4-BE49-F238E27FC236}">
+                <a16:creationId xmlns:a16="http://schemas.microsoft.com/office/drawing/2014/main" id="{7B5BC76A-1698-4AEA-B233-EDB4AAD37F05}"/>
+              </a:ext>
+            </a:extLst>
+          </p:cNvPr>
+          <p:cNvPicPr>
+            <a:picLocks noChangeAspect="1" noChangeArrowheads="1"/>
+          </p:cNvPicPr>
+          <p:nvPr/>
+        </p:nvPicPr>
+        <p:blipFill>
+          <a:blip r:embed="rId4">
+            <a:extLst>
+              <a:ext uri="{28A0092B-C50C-407E-A947-70E740481C1C}">
+                <a14:useLocalDpi xmlns:a14="http://schemas.microsoft.com/office/drawing/2010/main" val="0"/>
+              </a:ext>
+            </a:extLst>
+          </a:blip>
+          <a:srcRect/>
+          <a:stretch>
+            <a:fillRect/>
+          </a:stretch>
+        </p:blipFill>
+        <p:spPr bwMode="auto">
+          <a:xfrm>
+            <a:off x="8651969" y="1404280"/>
+            <a:ext cx="1198239" cy="1082248"/>
+          </a:xfrm>
+          <a:prstGeom prst="rect">
+            <a:avLst/>
+          </a:prstGeom>
+          <a:noFill/>
+          <a:extLst>
+            <a:ext uri="{909E8E84-426E-40DD-AFC4-6F175D3DCCD1}">
+              <a14:hiddenFill xmlns:a14="http://schemas.microsoft.com/office/drawing/2010/main">
+                <a:solidFill>
+                  <a:srgbClr val="FFFFFF"/>
+                </a:solidFill>
+              </a14:hiddenFill>
+            </a:ext>
+          </a:extLst>
         </p:spPr>
       </p:pic>
     </p:spTree>
     <p:extLst>
       <p:ext uri="{BB962C8B-B14F-4D97-AF65-F5344CB8AC3E}">
-        <p14:creationId xmlns:p14="http://schemas.microsoft.com/office/powerpoint/2010/main" val="2456776728"/>
+        <p14:creationId xmlns:p14="http://schemas.microsoft.com/office/powerpoint/2010/main" val="601440326"/>
       </p:ext>
     </p:extLst>
   </p:cSld>
@@ -8527,7 +8956,7 @@
         </p:nvSpPr>
         <p:spPr>
           <a:xfrm>
-            <a:off x="755168" y="91241"/>
+            <a:off x="646111" y="452718"/>
             <a:ext cx="9404723" cy="767687"/>
           </a:xfrm>
         </p:spPr>
@@ -8572,270 +9001,38 @@
           </a:p>
         </p:txBody>
       </p:sp>
-      <p:sp>
-        <p:nvSpPr>
-          <p:cNvPr id="13" name="ZoneTexte 12">
-            <a:extLst>
-              <a:ext uri="{FF2B5EF4-FFF2-40B4-BE49-F238E27FC236}">
-                <a16:creationId xmlns:a16="http://schemas.microsoft.com/office/drawing/2014/main" id="{9D019F64-FB14-4A50-B41F-0E1F7FBF3581}"/>
-              </a:ext>
-            </a:extLst>
-          </p:cNvPr>
-          <p:cNvSpPr txBox="1"/>
-          <p:nvPr/>
-        </p:nvSpPr>
-        <p:spPr>
-          <a:xfrm>
-            <a:off x="1228259" y="3464437"/>
-            <a:ext cx="2292334" cy="369332"/>
-          </a:xfrm>
-          <a:prstGeom prst="rect">
-            <a:avLst/>
-          </a:prstGeom>
-          <a:noFill/>
-        </p:spPr>
-        <p:txBody>
-          <a:bodyPr wrap="square" rtlCol="0">
-            <a:spAutoFit/>
-          </a:bodyPr>
-          <a:lstStyle/>
-          <a:p>
-            <a:pPr algn="ctr"/>
-            <a:r>
-              <a:rPr lang="fr-FR" dirty="0"/>
-              <a:t>Clone du projet</a:t>
-            </a:r>
-          </a:p>
-        </p:txBody>
-      </p:sp>
-      <p:sp>
-        <p:nvSpPr>
-          <p:cNvPr id="15" name="ZoneTexte 14">
-            <a:extLst>
-              <a:ext uri="{FF2B5EF4-FFF2-40B4-BE49-F238E27FC236}">
-                <a16:creationId xmlns:a16="http://schemas.microsoft.com/office/drawing/2014/main" id="{30E8C31B-0BF0-470B-BAD4-0E6C5002B9BC}"/>
-              </a:ext>
-            </a:extLst>
-          </p:cNvPr>
-          <p:cNvSpPr txBox="1"/>
-          <p:nvPr/>
-        </p:nvSpPr>
-        <p:spPr>
-          <a:xfrm>
-            <a:off x="7147249" y="2847442"/>
-            <a:ext cx="4639284" cy="1477328"/>
-          </a:xfrm>
-          <a:prstGeom prst="rect">
-            <a:avLst/>
-          </a:prstGeom>
-          <a:noFill/>
-        </p:spPr>
-        <p:txBody>
-          <a:bodyPr wrap="square" rtlCol="0">
-            <a:spAutoFit/>
-          </a:bodyPr>
-          <a:lstStyle/>
-          <a:p>
-            <a:r>
-              <a:rPr lang="fr-FR" b="1" dirty="0"/>
-              <a:t>Installation des package:</a:t>
-            </a:r>
-          </a:p>
-          <a:p>
-            <a:pPr marL="285750" lvl="0" indent="-285750">
-              <a:buFontTx/>
-              <a:buChar char="-"/>
-            </a:pPr>
-            <a:r>
-              <a:rPr lang="fr-FR" dirty="0" err="1"/>
-              <a:t>sudo</a:t>
-            </a:r>
-            <a:r>
-              <a:rPr lang="fr-FR" dirty="0"/>
-              <a:t> </a:t>
-            </a:r>
-            <a:r>
-              <a:rPr lang="fr-FR" dirty="0" err="1"/>
-              <a:t>apt</a:t>
-            </a:r>
-            <a:r>
-              <a:rPr lang="fr-FR" dirty="0"/>
-              <a:t> update</a:t>
-            </a:r>
-          </a:p>
-          <a:p>
-            <a:pPr marL="285750" indent="-285750">
-              <a:buFontTx/>
-              <a:buChar char="-"/>
-            </a:pPr>
-            <a:r>
-              <a:rPr lang="fr-FR" dirty="0" err="1"/>
-              <a:t>sudo</a:t>
-            </a:r>
-            <a:r>
-              <a:rPr lang="fr-FR" dirty="0"/>
-              <a:t> </a:t>
-            </a:r>
-            <a:r>
-              <a:rPr lang="fr-FR" dirty="0" err="1"/>
-              <a:t>apt</a:t>
-            </a:r>
-            <a:r>
-              <a:rPr lang="fr-FR" dirty="0"/>
-              <a:t> </a:t>
-            </a:r>
-            <a:r>
-              <a:rPr lang="fr-FR" dirty="0" err="1"/>
-              <a:t>install</a:t>
-            </a:r>
-            <a:r>
-              <a:rPr lang="fr-FR" dirty="0"/>
-              <a:t> python3-pip </a:t>
-            </a:r>
-            <a:r>
-              <a:rPr lang="fr-FR" dirty="0" err="1"/>
-              <a:t>mysql</a:t>
-            </a:r>
-            <a:r>
-              <a:rPr lang="fr-FR" dirty="0"/>
-              <a:t>-client </a:t>
-            </a:r>
-          </a:p>
-          <a:p>
-            <a:pPr marL="285750" lvl="0" indent="-285750">
-              <a:buFontTx/>
-              <a:buChar char="-"/>
-            </a:pPr>
-            <a:r>
-              <a:rPr lang="fr-FR" dirty="0"/>
-              <a:t>pip3 </a:t>
-            </a:r>
-            <a:r>
-              <a:rPr lang="fr-FR" dirty="0" err="1"/>
-              <a:t>install</a:t>
-            </a:r>
-            <a:r>
-              <a:rPr lang="fr-FR" dirty="0"/>
-              <a:t> boto3 </a:t>
-            </a:r>
-            <a:r>
-              <a:rPr lang="fr-FR" dirty="0" err="1"/>
-              <a:t>boto</a:t>
-            </a:r>
-            <a:r>
-              <a:rPr lang="fr-FR" dirty="0"/>
-              <a:t> </a:t>
-            </a:r>
-            <a:r>
-              <a:rPr lang="fr-FR" dirty="0" err="1"/>
-              <a:t>django</a:t>
-            </a:r>
-            <a:r>
-              <a:rPr lang="fr-FR" dirty="0"/>
-              <a:t> </a:t>
-            </a:r>
-          </a:p>
-        </p:txBody>
-      </p:sp>
-      <p:sp>
-        <p:nvSpPr>
-          <p:cNvPr id="5" name="Croix 4">
-            <a:extLst>
-              <a:ext uri="{FF2B5EF4-FFF2-40B4-BE49-F238E27FC236}">
-                <a16:creationId xmlns:a16="http://schemas.microsoft.com/office/drawing/2014/main" id="{8EFCC468-B003-40E8-9AAF-21F9602BB39D}"/>
-              </a:ext>
-            </a:extLst>
-          </p:cNvPr>
-          <p:cNvSpPr/>
-          <p:nvPr/>
-        </p:nvSpPr>
-        <p:spPr>
-          <a:xfrm>
-            <a:off x="5013426" y="3078759"/>
-            <a:ext cx="888206" cy="860727"/>
-          </a:xfrm>
-          <a:prstGeom prst="plus">
-            <a:avLst>
-              <a:gd name="adj" fmla="val 40594"/>
-            </a:avLst>
-          </a:prstGeom>
-        </p:spPr>
-        <p:style>
-          <a:lnRef idx="2">
-            <a:schemeClr val="accent1">
-              <a:shade val="50000"/>
-            </a:schemeClr>
-          </a:lnRef>
-          <a:fillRef idx="1">
-            <a:schemeClr val="accent1"/>
-          </a:fillRef>
-          <a:effectRef idx="0">
-            <a:schemeClr val="accent1"/>
-          </a:effectRef>
-          <a:fontRef idx="minor">
-            <a:schemeClr val="lt1"/>
-          </a:fontRef>
-        </p:style>
-        <p:txBody>
-          <a:bodyPr rtlCol="0" anchor="ctr"/>
-          <a:lstStyle/>
-          <a:p>
-            <a:pPr algn="ctr"/>
-            <a:endParaRPr lang="fr-FR"/>
-          </a:p>
-        </p:txBody>
-      </p:sp>
       <p:pic>
         <p:nvPicPr>
-          <p:cNvPr id="2050" name="Picture 2" descr="Résultat de recherche d'images pour &quot;logo github&quot;">
+          <p:cNvPr id="9" name="Image 8">
             <a:extLst>
               <a:ext uri="{FF2B5EF4-FFF2-40B4-BE49-F238E27FC236}">
-                <a16:creationId xmlns:a16="http://schemas.microsoft.com/office/drawing/2014/main" id="{48310027-9BAB-40ED-AA96-F43A970C6400}"/>
+                <a16:creationId xmlns:a16="http://schemas.microsoft.com/office/drawing/2014/main" id="{7E1922B4-816C-45A3-A8FF-68D1EB2F1E4D}"/>
               </a:ext>
             </a:extLst>
           </p:cNvPr>
-          <p:cNvPicPr>
-            <a:picLocks noChangeAspect="1" noChangeArrowheads="1"/>
-          </p:cNvPicPr>
+          <p:cNvPicPr/>
           <p:nvPr/>
         </p:nvPicPr>
         <p:blipFill>
-          <a:blip r:embed="rId2">
-            <a:extLst>
-              <a:ext uri="{28A0092B-C50C-407E-A947-70E740481C1C}">
-                <a14:useLocalDpi xmlns:a14="http://schemas.microsoft.com/office/drawing/2010/main" val="0"/>
-              </a:ext>
-            </a:extLst>
-          </a:blip>
-          <a:srcRect/>
+          <a:blip r:embed="rId2"/>
           <a:stretch>
             <a:fillRect/>
           </a:stretch>
         </p:blipFill>
-        <p:spPr bwMode="auto">
-          <a:xfrm>
-            <a:off x="1775307" y="2169372"/>
-            <a:ext cx="1198239" cy="1082248"/>
+        <p:spPr>
+          <a:xfrm>
+            <a:off x="1583769" y="1220405"/>
+            <a:ext cx="8467065" cy="5237503"/>
           </a:xfrm>
           <a:prstGeom prst="rect">
             <a:avLst/>
           </a:prstGeom>
-          <a:noFill/>
-          <a:extLst>
-            <a:ext uri="{909E8E84-426E-40DD-AFC4-6F175D3DCCD1}">
-              <a14:hiddenFill xmlns:a14="http://schemas.microsoft.com/office/drawing/2010/main">
-                <a:solidFill>
-                  <a:srgbClr val="FFFFFF"/>
-                </a:solidFill>
-              </a14:hiddenFill>
-            </a:ext>
-          </a:extLst>
         </p:spPr>
       </p:pic>
     </p:spTree>
     <p:extLst>
       <p:ext uri="{BB962C8B-B14F-4D97-AF65-F5344CB8AC3E}">
-        <p14:creationId xmlns:p14="http://schemas.microsoft.com/office/powerpoint/2010/main" val="3327560388"/>
+        <p14:creationId xmlns:p14="http://schemas.microsoft.com/office/powerpoint/2010/main" val="2456776728"/>
       </p:ext>
     </p:extLst>
   </p:cSld>
@@ -8939,8 +9136,8 @@
         </p:nvSpPr>
         <p:spPr>
           <a:xfrm>
-            <a:off x="3733295" y="1060091"/>
-            <a:ext cx="3448468" cy="369332"/>
+            <a:off x="1228259" y="3464437"/>
+            <a:ext cx="2292334" cy="369332"/>
           </a:xfrm>
           <a:prstGeom prst="rect">
             <a:avLst/>
@@ -8956,42 +9153,231 @@
             <a:pPr algn="ctr"/>
             <a:r>
               <a:rPr lang="fr-FR" dirty="0"/>
-              <a:t>Connexion à la BDD RDS</a:t>
-            </a:r>
-          </a:p>
-        </p:txBody>
-      </p:sp>
-      <p:pic>
-        <p:nvPicPr>
-          <p:cNvPr id="8" name="Image 7">
+              <a:t>Clone du projet</a:t>
+            </a:r>
+          </a:p>
+        </p:txBody>
+      </p:sp>
+      <p:sp>
+        <p:nvSpPr>
+          <p:cNvPr id="15" name="ZoneTexte 14">
             <a:extLst>
               <a:ext uri="{FF2B5EF4-FFF2-40B4-BE49-F238E27FC236}">
-                <a16:creationId xmlns:a16="http://schemas.microsoft.com/office/drawing/2014/main" id="{39BE7FBF-B9F5-4E4D-BEE9-6C0B4BFDE236}"/>
+                <a16:creationId xmlns:a16="http://schemas.microsoft.com/office/drawing/2014/main" id="{30E8C31B-0BF0-470B-BAD4-0E6C5002B9BC}"/>
               </a:ext>
             </a:extLst>
           </p:cNvPr>
-          <p:cNvPicPr/>
+          <p:cNvSpPr txBox="1"/>
           <p:nvPr/>
-        </p:nvPicPr>
-        <p:blipFill rotWithShape="1">
-          <a:blip r:embed="rId2"/>
-          <a:srcRect b="20868"/>
-          <a:stretch/>
-        </p:blipFill>
-        <p:spPr bwMode="auto">
-          <a:xfrm>
-            <a:off x="1018517" y="1630586"/>
-            <a:ext cx="9141374" cy="3872906"/>
+        </p:nvSpPr>
+        <p:spPr>
+          <a:xfrm>
+            <a:off x="7147249" y="2847442"/>
+            <a:ext cx="4639284" cy="1477328"/>
           </a:xfrm>
           <a:prstGeom prst="rect">
             <a:avLst/>
           </a:prstGeom>
-          <a:ln>
-            <a:noFill/>
-          </a:ln>
+          <a:noFill/>
+        </p:spPr>
+        <p:txBody>
+          <a:bodyPr wrap="square" rtlCol="0">
+            <a:spAutoFit/>
+          </a:bodyPr>
+          <a:lstStyle/>
+          <a:p>
+            <a:r>
+              <a:rPr lang="fr-FR" b="1" dirty="0"/>
+              <a:t>Installation des package:</a:t>
+            </a:r>
+          </a:p>
+          <a:p>
+            <a:pPr marL="285750" lvl="0" indent="-285750">
+              <a:buFontTx/>
+              <a:buChar char="-"/>
+            </a:pPr>
+            <a:r>
+              <a:rPr lang="fr-FR" dirty="0" err="1"/>
+              <a:t>sudo</a:t>
+            </a:r>
+            <a:r>
+              <a:rPr lang="fr-FR" dirty="0"/>
+              <a:t> </a:t>
+            </a:r>
+            <a:r>
+              <a:rPr lang="fr-FR" dirty="0" err="1"/>
+              <a:t>apt</a:t>
+            </a:r>
+            <a:r>
+              <a:rPr lang="fr-FR" dirty="0"/>
+              <a:t> update</a:t>
+            </a:r>
+          </a:p>
+          <a:p>
+            <a:pPr marL="285750" indent="-285750">
+              <a:buFontTx/>
+              <a:buChar char="-"/>
+            </a:pPr>
+            <a:r>
+              <a:rPr lang="fr-FR" dirty="0" err="1"/>
+              <a:t>sudo</a:t>
+            </a:r>
+            <a:r>
+              <a:rPr lang="fr-FR" dirty="0"/>
+              <a:t> </a:t>
+            </a:r>
+            <a:r>
+              <a:rPr lang="fr-FR" dirty="0" err="1"/>
+              <a:t>apt</a:t>
+            </a:r>
+            <a:r>
+              <a:rPr lang="fr-FR" dirty="0"/>
+              <a:t> </a:t>
+            </a:r>
+            <a:r>
+              <a:rPr lang="fr-FR" dirty="0" err="1"/>
+              <a:t>install</a:t>
+            </a:r>
+            <a:r>
+              <a:rPr lang="fr-FR" dirty="0"/>
+              <a:t> python3-pip </a:t>
+            </a:r>
+            <a:r>
+              <a:rPr lang="fr-FR" dirty="0" err="1"/>
+              <a:t>mysql</a:t>
+            </a:r>
+            <a:r>
+              <a:rPr lang="fr-FR" dirty="0"/>
+              <a:t>-client </a:t>
+            </a:r>
+          </a:p>
+          <a:p>
+            <a:pPr marL="285750" lvl="0" indent="-285750">
+              <a:buFontTx/>
+              <a:buChar char="-"/>
+            </a:pPr>
+            <a:r>
+              <a:rPr lang="fr-FR" dirty="0"/>
+              <a:t>pip3 </a:t>
+            </a:r>
+            <a:r>
+              <a:rPr lang="fr-FR" dirty="0" err="1"/>
+              <a:t>install</a:t>
+            </a:r>
+            <a:r>
+              <a:rPr lang="fr-FR" dirty="0"/>
+              <a:t> boto3 </a:t>
+            </a:r>
+            <a:r>
+              <a:rPr lang="fr-FR" dirty="0" err="1"/>
+              <a:t>boto</a:t>
+            </a:r>
+            <a:r>
+              <a:rPr lang="fr-FR" dirty="0"/>
+              <a:t> </a:t>
+            </a:r>
+            <a:r>
+              <a:rPr lang="fr-FR" dirty="0" err="1"/>
+              <a:t>django</a:t>
+            </a:r>
+            <a:r>
+              <a:rPr lang="fr-FR" dirty="0"/>
+              <a:t> </a:t>
+            </a:r>
+          </a:p>
+        </p:txBody>
+      </p:sp>
+      <p:sp>
+        <p:nvSpPr>
+          <p:cNvPr id="5" name="Croix 4">
+            <a:extLst>
+              <a:ext uri="{FF2B5EF4-FFF2-40B4-BE49-F238E27FC236}">
+                <a16:creationId xmlns:a16="http://schemas.microsoft.com/office/drawing/2014/main" id="{8EFCC468-B003-40E8-9AAF-21F9602BB39D}"/>
+              </a:ext>
+            </a:extLst>
+          </p:cNvPr>
+          <p:cNvSpPr/>
+          <p:nvPr/>
+        </p:nvSpPr>
+        <p:spPr>
+          <a:xfrm>
+            <a:off x="5013426" y="3078759"/>
+            <a:ext cx="888206" cy="860727"/>
+          </a:xfrm>
+          <a:prstGeom prst="plus">
+            <a:avLst>
+              <a:gd name="adj" fmla="val 40594"/>
+            </a:avLst>
+          </a:prstGeom>
+        </p:spPr>
+        <p:style>
+          <a:lnRef idx="2">
+            <a:schemeClr val="accent1">
+              <a:shade val="50000"/>
+            </a:schemeClr>
+          </a:lnRef>
+          <a:fillRef idx="1">
+            <a:schemeClr val="accent1"/>
+          </a:fillRef>
+          <a:effectRef idx="0">
+            <a:schemeClr val="accent1"/>
+          </a:effectRef>
+          <a:fontRef idx="minor">
+            <a:schemeClr val="lt1"/>
+          </a:fontRef>
+        </p:style>
+        <p:txBody>
+          <a:bodyPr rtlCol="0" anchor="ctr"/>
+          <a:lstStyle/>
+          <a:p>
+            <a:pPr algn="ctr"/>
+            <a:endParaRPr lang="fr-FR"/>
+          </a:p>
+        </p:txBody>
+      </p:sp>
+      <p:pic>
+        <p:nvPicPr>
+          <p:cNvPr id="2050" name="Picture 2" descr="Résultat de recherche d'images pour &quot;logo github&quot;">
+            <a:extLst>
+              <a:ext uri="{FF2B5EF4-FFF2-40B4-BE49-F238E27FC236}">
+                <a16:creationId xmlns:a16="http://schemas.microsoft.com/office/drawing/2014/main" id="{48310027-9BAB-40ED-AA96-F43A970C6400}"/>
+              </a:ext>
+            </a:extLst>
+          </p:cNvPr>
+          <p:cNvPicPr>
+            <a:picLocks noChangeAspect="1" noChangeArrowheads="1"/>
+          </p:cNvPicPr>
+          <p:nvPr/>
+        </p:nvPicPr>
+        <p:blipFill>
+          <a:blip r:embed="rId2">
+            <a:extLst>
+              <a:ext uri="{28A0092B-C50C-407E-A947-70E740481C1C}">
+                <a14:useLocalDpi xmlns:a14="http://schemas.microsoft.com/office/drawing/2010/main" val="0"/>
+              </a:ext>
+            </a:extLst>
+          </a:blip>
+          <a:srcRect/>
+          <a:stretch>
+            <a:fillRect/>
+          </a:stretch>
+        </p:blipFill>
+        <p:spPr bwMode="auto">
+          <a:xfrm>
+            <a:off x="1775307" y="2169372"/>
+            <a:ext cx="1198239" cy="1082248"/>
+          </a:xfrm>
+          <a:prstGeom prst="rect">
+            <a:avLst/>
+          </a:prstGeom>
+          <a:noFill/>
           <a:extLst>
-            <a:ext uri="{53640926-AAD7-44D8-BBD7-CCE9431645EC}">
-              <a14:shadowObscured xmlns:a14="http://schemas.microsoft.com/office/drawing/2010/main"/>
+            <a:ext uri="{909E8E84-426E-40DD-AFC4-6F175D3DCCD1}">
+              <a14:hiddenFill xmlns:a14="http://schemas.microsoft.com/office/drawing/2010/main">
+                <a:solidFill>
+                  <a:srgbClr val="FFFFFF"/>
+                </a:solidFill>
+              </a14:hiddenFill>
             </a:ext>
           </a:extLst>
         </p:spPr>
@@ -8999,7 +9385,7 @@
     </p:spTree>
     <p:extLst>
       <p:ext uri="{BB962C8B-B14F-4D97-AF65-F5344CB8AC3E}">
-        <p14:creationId xmlns:p14="http://schemas.microsoft.com/office/powerpoint/2010/main" val="2632746022"/>
+        <p14:creationId xmlns:p14="http://schemas.microsoft.com/office/powerpoint/2010/main" val="3327560388"/>
       </p:ext>
     </p:extLst>
   </p:cSld>
@@ -9089,197 +9475,81 @@
           </a:p>
         </p:txBody>
       </p:sp>
+      <p:sp>
+        <p:nvSpPr>
+          <p:cNvPr id="13" name="ZoneTexte 12">
+            <a:extLst>
+              <a:ext uri="{FF2B5EF4-FFF2-40B4-BE49-F238E27FC236}">
+                <a16:creationId xmlns:a16="http://schemas.microsoft.com/office/drawing/2014/main" id="{9D019F64-FB14-4A50-B41F-0E1F7FBF3581}"/>
+              </a:ext>
+            </a:extLst>
+          </p:cNvPr>
+          <p:cNvSpPr txBox="1"/>
+          <p:nvPr/>
+        </p:nvSpPr>
+        <p:spPr>
+          <a:xfrm>
+            <a:off x="3733295" y="1060091"/>
+            <a:ext cx="3448468" cy="369332"/>
+          </a:xfrm>
+          <a:prstGeom prst="rect">
+            <a:avLst/>
+          </a:prstGeom>
+          <a:noFill/>
+        </p:spPr>
+        <p:txBody>
+          <a:bodyPr wrap="square" rtlCol="0">
+            <a:spAutoFit/>
+          </a:bodyPr>
+          <a:lstStyle/>
+          <a:p>
+            <a:pPr algn="ctr"/>
+            <a:r>
+              <a:rPr lang="fr-FR" dirty="0"/>
+              <a:t>Connexion à la BDD RDS</a:t>
+            </a:r>
+          </a:p>
+        </p:txBody>
+      </p:sp>
       <p:pic>
         <p:nvPicPr>
-          <p:cNvPr id="9" name="Image 8">
+          <p:cNvPr id="8" name="Image 7">
             <a:extLst>
               <a:ext uri="{FF2B5EF4-FFF2-40B4-BE49-F238E27FC236}">
-                <a16:creationId xmlns:a16="http://schemas.microsoft.com/office/drawing/2014/main" id="{0D53FE6E-133C-4F8B-ADD8-E4D53B89C186}"/>
+                <a16:creationId xmlns:a16="http://schemas.microsoft.com/office/drawing/2014/main" id="{39BE7FBF-B9F5-4E4D-BEE9-6C0B4BFDE236}"/>
               </a:ext>
             </a:extLst>
           </p:cNvPr>
           <p:cNvPicPr/>
           <p:nvPr/>
         </p:nvPicPr>
-        <p:blipFill>
+        <p:blipFill rotWithShape="1">
           <a:blip r:embed="rId2"/>
-          <a:stretch>
-            <a:fillRect/>
-          </a:stretch>
+          <a:srcRect b="20868"/>
+          <a:stretch/>
         </p:blipFill>
-        <p:spPr>
-          <a:xfrm>
-            <a:off x="1164249" y="1758257"/>
-            <a:ext cx="8884546" cy="516107"/>
+        <p:spPr bwMode="auto">
+          <a:xfrm>
+            <a:off x="1018517" y="1630586"/>
+            <a:ext cx="9141374" cy="3872906"/>
           </a:xfrm>
           <a:prstGeom prst="rect">
             <a:avLst/>
           </a:prstGeom>
-        </p:spPr>
-      </p:pic>
-      <p:pic>
-        <p:nvPicPr>
-          <p:cNvPr id="10" name="Image 9">
-            <a:extLst>
-              <a:ext uri="{FF2B5EF4-FFF2-40B4-BE49-F238E27FC236}">
-                <a16:creationId xmlns:a16="http://schemas.microsoft.com/office/drawing/2014/main" id="{2DF3E4C3-453B-4826-BDE3-513F14F886E3}"/>
-              </a:ext>
-            </a:extLst>
-          </p:cNvPr>
-          <p:cNvPicPr/>
-          <p:nvPr/>
-        </p:nvPicPr>
-        <p:blipFill>
-          <a:blip r:embed="rId3"/>
-          <a:stretch>
-            <a:fillRect/>
-          </a:stretch>
-        </p:blipFill>
-        <p:spPr>
-          <a:xfrm>
-            <a:off x="1164249" y="2621125"/>
-            <a:ext cx="8884546" cy="516107"/>
-          </a:xfrm>
-          <a:prstGeom prst="rect">
-            <a:avLst/>
-          </a:prstGeom>
-        </p:spPr>
-      </p:pic>
-      <p:sp>
-        <p:nvSpPr>
-          <p:cNvPr id="11" name="ZoneTexte 10">
-            <a:extLst>
-              <a:ext uri="{FF2B5EF4-FFF2-40B4-BE49-F238E27FC236}">
-                <a16:creationId xmlns:a16="http://schemas.microsoft.com/office/drawing/2014/main" id="{BE7A9C9C-A62F-4AD7-9CDB-5D693E6309C0}"/>
-              </a:ext>
-            </a:extLst>
-          </p:cNvPr>
-          <p:cNvSpPr txBox="1"/>
-          <p:nvPr/>
-        </p:nvSpPr>
-        <p:spPr>
-          <a:xfrm>
-            <a:off x="3663423" y="1161425"/>
-            <a:ext cx="3448468" cy="369332"/>
-          </a:xfrm>
-          <a:prstGeom prst="rect">
-            <a:avLst/>
-          </a:prstGeom>
-          <a:noFill/>
-        </p:spPr>
-        <p:txBody>
-          <a:bodyPr wrap="square" rtlCol="0">
-            <a:spAutoFit/>
-          </a:bodyPr>
-          <a:lstStyle/>
-          <a:p>
-            <a:pPr algn="ctr"/>
-            <a:r>
-              <a:rPr lang="fr-FR" dirty="0"/>
-              <a:t>Création de la table</a:t>
-            </a:r>
-          </a:p>
-        </p:txBody>
-      </p:sp>
-      <p:sp>
-        <p:nvSpPr>
-          <p:cNvPr id="3" name="Rectangle 2">
-            <a:extLst>
-              <a:ext uri="{FF2B5EF4-FFF2-40B4-BE49-F238E27FC236}">
-                <a16:creationId xmlns:a16="http://schemas.microsoft.com/office/drawing/2014/main" id="{9549E62F-0482-40CE-8F6F-66F09B9F2EA4}"/>
-              </a:ext>
-            </a:extLst>
-          </p:cNvPr>
-          <p:cNvSpPr/>
-          <p:nvPr/>
-        </p:nvSpPr>
-        <p:spPr>
-          <a:xfrm>
-            <a:off x="1164249" y="4108340"/>
-            <a:ext cx="8884546" cy="892552"/>
-          </a:xfrm>
-          <a:prstGeom prst="rect">
-            <a:avLst/>
-          </a:prstGeom>
-        </p:spPr>
-        <p:txBody>
-          <a:bodyPr wrap="square">
-            <a:spAutoFit/>
-          </a:bodyPr>
-          <a:lstStyle/>
-          <a:p>
-            <a:pPr algn="ctr"/>
-            <a:r>
-              <a:rPr lang="fr-FR" dirty="0">
-                <a:ea typeface="Calibri" panose="020F0502020204030204" pitchFamily="34" charset="0"/>
-              </a:rPr>
-              <a:t>On lance le serveur</a:t>
-            </a:r>
-          </a:p>
-          <a:p>
-            <a:endParaRPr lang="fr-FR" sz="1600" dirty="0">
-              <a:ea typeface="Calibri" panose="020F0502020204030204" pitchFamily="34" charset="0"/>
-            </a:endParaRPr>
-          </a:p>
-          <a:p>
-            <a:pPr algn="ctr"/>
-            <a:r>
-              <a:rPr lang="fr-FR" dirty="0">
-                <a:ea typeface="Calibri" panose="020F0502020204030204" pitchFamily="34" charset="0"/>
-              </a:rPr>
-              <a:t>python3 manage.py </a:t>
-            </a:r>
-            <a:r>
-              <a:rPr lang="fr-FR" dirty="0" err="1">
-                <a:ea typeface="Calibri" panose="020F0502020204030204" pitchFamily="34" charset="0"/>
-              </a:rPr>
-              <a:t>runserver</a:t>
-            </a:r>
-            <a:r>
-              <a:rPr lang="fr-FR" dirty="0">
-                <a:ea typeface="Calibri" panose="020F0502020204030204" pitchFamily="34" charset="0"/>
-              </a:rPr>
-              <a:t> 0.0.0.0:8081</a:t>
-            </a:r>
-            <a:endParaRPr lang="fr-FR" sz="1600" dirty="0">
-              <a:effectLst/>
-              <a:ea typeface="Calibri" panose="020F0502020204030204" pitchFamily="34" charset="0"/>
-            </a:endParaRPr>
-          </a:p>
-        </p:txBody>
-      </p:sp>
-      <p:pic>
-        <p:nvPicPr>
-          <p:cNvPr id="12" name="Image 11">
-            <a:extLst>
-              <a:ext uri="{FF2B5EF4-FFF2-40B4-BE49-F238E27FC236}">
-                <a16:creationId xmlns:a16="http://schemas.microsoft.com/office/drawing/2014/main" id="{DB4D57DF-CF66-46D1-B396-E504912999FF}"/>
-              </a:ext>
-            </a:extLst>
-          </p:cNvPr>
-          <p:cNvPicPr/>
-          <p:nvPr/>
-        </p:nvPicPr>
-        <p:blipFill>
-          <a:blip r:embed="rId4"/>
-          <a:stretch>
-            <a:fillRect/>
-          </a:stretch>
-        </p:blipFill>
-        <p:spPr>
-          <a:xfrm>
-            <a:off x="1244227" y="5041725"/>
-            <a:ext cx="8804567" cy="1375853"/>
-          </a:xfrm>
-          <a:prstGeom prst="rect">
-            <a:avLst/>
-          </a:prstGeom>
+          <a:ln>
+            <a:noFill/>
+          </a:ln>
+          <a:extLst>
+            <a:ext uri="{53640926-AAD7-44D8-BBD7-CCE9431645EC}">
+              <a14:shadowObscured xmlns:a14="http://schemas.microsoft.com/office/drawing/2010/main"/>
+            </a:ext>
+          </a:extLst>
         </p:spPr>
       </p:pic>
     </p:spTree>
     <p:extLst>
       <p:ext uri="{BB962C8B-B14F-4D97-AF65-F5344CB8AC3E}">
-        <p14:creationId xmlns:p14="http://schemas.microsoft.com/office/powerpoint/2010/main" val="3436412691"/>
+        <p14:creationId xmlns:p14="http://schemas.microsoft.com/office/powerpoint/2010/main" val="2632746022"/>
       </p:ext>
     </p:extLst>
   </p:cSld>
@@ -9311,7 +9581,7 @@
           <p:cNvPr id="2" name="Titre 1">
             <a:extLst>
               <a:ext uri="{FF2B5EF4-FFF2-40B4-BE49-F238E27FC236}">
-                <a16:creationId xmlns:a16="http://schemas.microsoft.com/office/drawing/2014/main" id="{D08BF119-3E8F-463D-A207-098AE2C89600}"/>
+                <a16:creationId xmlns:a16="http://schemas.microsoft.com/office/drawing/2014/main" id="{BE0F64FA-C67B-43FB-B6A9-F0C4A0C94D9A}"/>
               </a:ext>
             </a:extLst>
           </p:cNvPr>
@@ -9324,7 +9594,7 @@
         </p:nvSpPr>
         <p:spPr>
           <a:xfrm>
-            <a:off x="646111" y="452718"/>
+            <a:off x="755168" y="91241"/>
             <a:ext cx="9404723" cy="767687"/>
           </a:xfrm>
         </p:spPr>
@@ -9334,29 +9604,80 @@
           <a:p>
             <a:pPr algn="ctr"/>
             <a:r>
-              <a:rPr lang="fr-FR" dirty="0"/>
-              <a:t>Démonstration de l’application</a:t>
-            </a:r>
+              <a:rPr lang="fr-FR" sz="3600" dirty="0"/>
+              <a:t>Machine 2 – EC2</a:t>
+            </a:r>
+          </a:p>
+        </p:txBody>
+      </p:sp>
+      <p:sp>
+        <p:nvSpPr>
+          <p:cNvPr id="4" name="Espace réservé du numéro de diapositive 3">
+            <a:extLst>
+              <a:ext uri="{FF2B5EF4-FFF2-40B4-BE49-F238E27FC236}">
+                <a16:creationId xmlns:a16="http://schemas.microsoft.com/office/drawing/2014/main" id="{38249652-F7EA-4630-A286-4A955786FBEF}"/>
+              </a:ext>
+            </a:extLst>
+          </p:cNvPr>
+          <p:cNvSpPr>
+            <a:spLocks noGrp="1"/>
+          </p:cNvSpPr>
+          <p:nvPr>
+            <p:ph type="sldNum" sz="quarter" idx="12"/>
+          </p:nvPr>
+        </p:nvSpPr>
+        <p:spPr/>
+        <p:txBody>
+          <a:bodyPr/>
+          <a:lstStyle/>
+          <a:p>
+            <a:fld id="{D57F1E4F-1CFF-5643-939E-02111984F565}" type="slidenum">
+              <a:rPr lang="en-US" smtClean="0"/>
+              <a:t>18</a:t>
+            </a:fld>
+            <a:endParaRPr lang="en-US" dirty="0"/>
           </a:p>
         </p:txBody>
       </p:sp>
       <p:pic>
         <p:nvPicPr>
-          <p:cNvPr id="5" name="Média en ligne 4" title="Soutenance aws ESGI 2021 GP 3">
-            <a:hlinkClick r:id="" action="ppaction://media"/>
+          <p:cNvPr id="9" name="Image 8">
             <a:extLst>
               <a:ext uri="{FF2B5EF4-FFF2-40B4-BE49-F238E27FC236}">
-                <a16:creationId xmlns:a16="http://schemas.microsoft.com/office/drawing/2014/main" id="{129BA2DD-5C30-4BBE-9752-464B0FDF4869}"/>
+                <a16:creationId xmlns:a16="http://schemas.microsoft.com/office/drawing/2014/main" id="{0D53FE6E-133C-4F8B-ADD8-E4D53B89C186}"/>
               </a:ext>
             </a:extLst>
           </p:cNvPr>
-          <p:cNvPicPr>
-            <a:picLocks noGrp="1" noRot="1" noChangeAspect="1"/>
-          </p:cNvPicPr>
-          <p:nvPr>
-            <p:ph idx="1"/>
-            <a:videoFile r:link="rId1"/>
-          </p:nvPr>
+          <p:cNvPicPr/>
+          <p:nvPr/>
+        </p:nvPicPr>
+        <p:blipFill>
+          <a:blip r:embed="rId2"/>
+          <a:stretch>
+            <a:fillRect/>
+          </a:stretch>
+        </p:blipFill>
+        <p:spPr>
+          <a:xfrm>
+            <a:off x="1164249" y="1758257"/>
+            <a:ext cx="8884546" cy="516107"/>
+          </a:xfrm>
+          <a:prstGeom prst="rect">
+            <a:avLst/>
+          </a:prstGeom>
+        </p:spPr>
+      </p:pic>
+      <p:pic>
+        <p:nvPicPr>
+          <p:cNvPr id="10" name="Image 9">
+            <a:extLst>
+              <a:ext uri="{FF2B5EF4-FFF2-40B4-BE49-F238E27FC236}">
+                <a16:creationId xmlns:a16="http://schemas.microsoft.com/office/drawing/2014/main" id="{2DF3E4C3-453B-4826-BDE3-513F14F886E3}"/>
+              </a:ext>
+            </a:extLst>
+          </p:cNvPr>
+          <p:cNvPicPr/>
+          <p:nvPr/>
         </p:nvPicPr>
         <p:blipFill>
           <a:blip r:embed="rId3"/>
@@ -9366,8 +9687,8 @@
         </p:blipFill>
         <p:spPr>
           <a:xfrm>
-            <a:off x="807535" y="1322730"/>
-            <a:ext cx="9243299" cy="5222325"/>
+            <a:off x="1164249" y="2621125"/>
+            <a:ext cx="8884546" cy="516107"/>
           </a:xfrm>
           <a:prstGeom prst="rect">
             <a:avLst/>
@@ -9376,6 +9697,235 @@
       </p:pic>
       <p:sp>
         <p:nvSpPr>
+          <p:cNvPr id="11" name="ZoneTexte 10">
+            <a:extLst>
+              <a:ext uri="{FF2B5EF4-FFF2-40B4-BE49-F238E27FC236}">
+                <a16:creationId xmlns:a16="http://schemas.microsoft.com/office/drawing/2014/main" id="{BE7A9C9C-A62F-4AD7-9CDB-5D693E6309C0}"/>
+              </a:ext>
+            </a:extLst>
+          </p:cNvPr>
+          <p:cNvSpPr txBox="1"/>
+          <p:nvPr/>
+        </p:nvSpPr>
+        <p:spPr>
+          <a:xfrm>
+            <a:off x="3663423" y="1161425"/>
+            <a:ext cx="3448468" cy="369332"/>
+          </a:xfrm>
+          <a:prstGeom prst="rect">
+            <a:avLst/>
+          </a:prstGeom>
+          <a:noFill/>
+        </p:spPr>
+        <p:txBody>
+          <a:bodyPr wrap="square" rtlCol="0">
+            <a:spAutoFit/>
+          </a:bodyPr>
+          <a:lstStyle/>
+          <a:p>
+            <a:pPr algn="ctr"/>
+            <a:r>
+              <a:rPr lang="fr-FR" dirty="0"/>
+              <a:t>Création de la table</a:t>
+            </a:r>
+          </a:p>
+        </p:txBody>
+      </p:sp>
+      <p:sp>
+        <p:nvSpPr>
+          <p:cNvPr id="3" name="Rectangle 2">
+            <a:extLst>
+              <a:ext uri="{FF2B5EF4-FFF2-40B4-BE49-F238E27FC236}">
+                <a16:creationId xmlns:a16="http://schemas.microsoft.com/office/drawing/2014/main" id="{9549E62F-0482-40CE-8F6F-66F09B9F2EA4}"/>
+              </a:ext>
+            </a:extLst>
+          </p:cNvPr>
+          <p:cNvSpPr/>
+          <p:nvPr/>
+        </p:nvSpPr>
+        <p:spPr>
+          <a:xfrm>
+            <a:off x="1164249" y="4108340"/>
+            <a:ext cx="8884546" cy="892552"/>
+          </a:xfrm>
+          <a:prstGeom prst="rect">
+            <a:avLst/>
+          </a:prstGeom>
+        </p:spPr>
+        <p:txBody>
+          <a:bodyPr wrap="square">
+            <a:spAutoFit/>
+          </a:bodyPr>
+          <a:lstStyle/>
+          <a:p>
+            <a:pPr algn="ctr"/>
+            <a:r>
+              <a:rPr lang="fr-FR" dirty="0">
+                <a:ea typeface="Calibri" panose="020F0502020204030204" pitchFamily="34" charset="0"/>
+              </a:rPr>
+              <a:t>On lance le serveur</a:t>
+            </a:r>
+          </a:p>
+          <a:p>
+            <a:endParaRPr lang="fr-FR" sz="1600" dirty="0">
+              <a:ea typeface="Calibri" panose="020F0502020204030204" pitchFamily="34" charset="0"/>
+            </a:endParaRPr>
+          </a:p>
+          <a:p>
+            <a:pPr algn="ctr"/>
+            <a:r>
+              <a:rPr lang="fr-FR" dirty="0">
+                <a:ea typeface="Calibri" panose="020F0502020204030204" pitchFamily="34" charset="0"/>
+              </a:rPr>
+              <a:t>python3 manage.py </a:t>
+            </a:r>
+            <a:r>
+              <a:rPr lang="fr-FR" dirty="0" err="1">
+                <a:ea typeface="Calibri" panose="020F0502020204030204" pitchFamily="34" charset="0"/>
+              </a:rPr>
+              <a:t>runserver</a:t>
+            </a:r>
+            <a:r>
+              <a:rPr lang="fr-FR" dirty="0">
+                <a:ea typeface="Calibri" panose="020F0502020204030204" pitchFamily="34" charset="0"/>
+              </a:rPr>
+              <a:t> 0.0.0.0:8081</a:t>
+            </a:r>
+            <a:endParaRPr lang="fr-FR" sz="1600" dirty="0">
+              <a:effectLst/>
+              <a:ea typeface="Calibri" panose="020F0502020204030204" pitchFamily="34" charset="0"/>
+            </a:endParaRPr>
+          </a:p>
+        </p:txBody>
+      </p:sp>
+      <p:pic>
+        <p:nvPicPr>
+          <p:cNvPr id="12" name="Image 11">
+            <a:extLst>
+              <a:ext uri="{FF2B5EF4-FFF2-40B4-BE49-F238E27FC236}">
+                <a16:creationId xmlns:a16="http://schemas.microsoft.com/office/drawing/2014/main" id="{DB4D57DF-CF66-46D1-B396-E504912999FF}"/>
+              </a:ext>
+            </a:extLst>
+          </p:cNvPr>
+          <p:cNvPicPr/>
+          <p:nvPr/>
+        </p:nvPicPr>
+        <p:blipFill>
+          <a:blip r:embed="rId4"/>
+          <a:stretch>
+            <a:fillRect/>
+          </a:stretch>
+        </p:blipFill>
+        <p:spPr>
+          <a:xfrm>
+            <a:off x="1244227" y="5041725"/>
+            <a:ext cx="8804567" cy="1375853"/>
+          </a:xfrm>
+          <a:prstGeom prst="rect">
+            <a:avLst/>
+          </a:prstGeom>
+        </p:spPr>
+      </p:pic>
+    </p:spTree>
+    <p:extLst>
+      <p:ext uri="{BB962C8B-B14F-4D97-AF65-F5344CB8AC3E}">
+        <p14:creationId xmlns:p14="http://schemas.microsoft.com/office/powerpoint/2010/main" val="3436412691"/>
+      </p:ext>
+    </p:extLst>
+  </p:cSld>
+  <p:clrMapOvr>
+    <a:masterClrMapping/>
+  </p:clrMapOvr>
+</p:sld>
+</file>
+
+<file path=ppt/slides/slide19.xml><?xml version="1.0" encoding="utf-8"?>
+<p:sld xmlns:a="http://schemas.openxmlformats.org/drawingml/2006/main" xmlns:r="http://schemas.openxmlformats.org/officeDocument/2006/relationships" xmlns:p="http://schemas.openxmlformats.org/presentationml/2006/main">
+  <p:cSld>
+    <p:spTree>
+      <p:nvGrpSpPr>
+        <p:cNvPr id="1" name=""/>
+        <p:cNvGrpSpPr/>
+        <p:nvPr/>
+      </p:nvGrpSpPr>
+      <p:grpSpPr>
+        <a:xfrm>
+          <a:off x="0" y="0"/>
+          <a:ext cx="0" cy="0"/>
+          <a:chOff x="0" y="0"/>
+          <a:chExt cx="0" cy="0"/>
+        </a:xfrm>
+      </p:grpSpPr>
+      <p:sp>
+        <p:nvSpPr>
+          <p:cNvPr id="2" name="Titre 1">
+            <a:extLst>
+              <a:ext uri="{FF2B5EF4-FFF2-40B4-BE49-F238E27FC236}">
+                <a16:creationId xmlns:a16="http://schemas.microsoft.com/office/drawing/2014/main" id="{D08BF119-3E8F-463D-A207-098AE2C89600}"/>
+              </a:ext>
+            </a:extLst>
+          </p:cNvPr>
+          <p:cNvSpPr>
+            <a:spLocks noGrp="1"/>
+          </p:cNvSpPr>
+          <p:nvPr>
+            <p:ph type="title"/>
+          </p:nvPr>
+        </p:nvSpPr>
+        <p:spPr>
+          <a:xfrm>
+            <a:off x="646111" y="452718"/>
+            <a:ext cx="9404723" cy="767687"/>
+          </a:xfrm>
+        </p:spPr>
+        <p:txBody>
+          <a:bodyPr/>
+          <a:lstStyle/>
+          <a:p>
+            <a:pPr algn="ctr"/>
+            <a:r>
+              <a:rPr lang="fr-FR" dirty="0"/>
+              <a:t>Démonstration de l’application</a:t>
+            </a:r>
+          </a:p>
+        </p:txBody>
+      </p:sp>
+      <p:pic>
+        <p:nvPicPr>
+          <p:cNvPr id="5" name="Média en ligne 4" title="Soutenance aws ESGI 2021 GP 3">
+            <a:hlinkClick r:id="" action="ppaction://media"/>
+            <a:extLst>
+              <a:ext uri="{FF2B5EF4-FFF2-40B4-BE49-F238E27FC236}">
+                <a16:creationId xmlns:a16="http://schemas.microsoft.com/office/drawing/2014/main" id="{129BA2DD-5C30-4BBE-9752-464B0FDF4869}"/>
+              </a:ext>
+            </a:extLst>
+          </p:cNvPr>
+          <p:cNvPicPr>
+            <a:picLocks noGrp="1" noRot="1" noChangeAspect="1"/>
+          </p:cNvPicPr>
+          <p:nvPr>
+            <p:ph idx="1"/>
+            <a:videoFile r:link="rId1"/>
+          </p:nvPr>
+        </p:nvPicPr>
+        <p:blipFill>
+          <a:blip r:embed="rId3"/>
+          <a:stretch>
+            <a:fillRect/>
+          </a:stretch>
+        </p:blipFill>
+        <p:spPr>
+          <a:xfrm>
+            <a:off x="807535" y="1322730"/>
+            <a:ext cx="9243299" cy="5222325"/>
+          </a:xfrm>
+          <a:prstGeom prst="rect">
+            <a:avLst/>
+          </a:prstGeom>
+        </p:spPr>
+      </p:pic>
+      <p:sp>
+        <p:nvSpPr>
           <p:cNvPr id="4" name="Espace réservé du numéro de diapositive 3">
             <a:extLst>
               <a:ext uri="{FF2B5EF4-FFF2-40B4-BE49-F238E27FC236}">
@@ -9397,7 +9947,7 @@
           <a:p>
             <a:fld id="{D57F1E4F-1CFF-5643-939E-02111984F565}" type="slidenum">
               <a:rPr lang="en-US" smtClean="0"/>
-              <a:t>18</a:t>
+              <a:t>19</a:t>
             </a:fld>
             <a:endParaRPr lang="en-US" dirty="0"/>
           </a:p>
@@ -9621,13 +10171,22 @@
         </p:spPr>
         <p:txBody>
           <a:bodyPr>
-            <a:normAutofit fontScale="92500" lnSpcReduction="20000"/>
+            <a:normAutofit fontScale="77500" lnSpcReduction="20000"/>
           </a:bodyPr>
           <a:lstStyle/>
           <a:p>
             <a:r>
               <a:rPr lang="fr-FR" dirty="0"/>
-              <a:t>Présentation de l’architecture du projet </a:t>
+              <a:t>Présentation de l’architecture du projet</a:t>
+            </a:r>
+          </a:p>
+          <a:p>
+            <a:endParaRPr lang="fr-FR" dirty="0"/>
+          </a:p>
+          <a:p>
+            <a:r>
+              <a:rPr lang="fr-FR" dirty="0"/>
+              <a:t>IAM </a:t>
             </a:r>
           </a:p>
           <a:p>
@@ -10609,7 +11168,7 @@
           <p:cNvPr id="2" name="Titre 1">
             <a:extLst>
               <a:ext uri="{FF2B5EF4-FFF2-40B4-BE49-F238E27FC236}">
-                <a16:creationId xmlns:a16="http://schemas.microsoft.com/office/drawing/2014/main" id="{0D7F41CD-C7AA-4336-9030-C02371A659E1}"/>
+                <a16:creationId xmlns:a16="http://schemas.microsoft.com/office/drawing/2014/main" id="{B9C65BBB-C15D-43FF-91EE-9AAEBF3B3216}"/>
               </a:ext>
             </a:extLst>
           </p:cNvPr>
@@ -10620,25 +11179,16 @@
             <p:ph type="title"/>
           </p:nvPr>
         </p:nvSpPr>
-        <p:spPr>
-          <a:xfrm>
-            <a:off x="629334" y="148728"/>
-            <a:ext cx="9404723" cy="914688"/>
-          </a:xfrm>
-        </p:spPr>
+        <p:spPr/>
         <p:txBody>
           <a:bodyPr/>
           <a:lstStyle/>
           <a:p>
             <a:pPr algn="ctr"/>
             <a:r>
-              <a:rPr lang="fr-FR" b="1" dirty="0"/>
-              <a:t>Groupes de sécurités</a:t>
-            </a:r>
-            <a:br>
-              <a:rPr lang="fr-FR" b="1" dirty="0"/>
-            </a:br>
-            <a:endParaRPr lang="fr-FR" b="1" dirty="0"/>
+              <a:rPr lang="fr-FR" dirty="0"/>
+              <a:t>IAM</a:t>
+            </a:r>
           </a:p>
         </p:txBody>
       </p:sp>
@@ -10647,7 +11197,7 @@
           <p:cNvPr id="4" name="Espace réservé du numéro de diapositive 3">
             <a:extLst>
               <a:ext uri="{FF2B5EF4-FFF2-40B4-BE49-F238E27FC236}">
-                <a16:creationId xmlns:a16="http://schemas.microsoft.com/office/drawing/2014/main" id="{DA3A3848-0889-425E-B4CF-707327F425F1}"/>
+                <a16:creationId xmlns:a16="http://schemas.microsoft.com/office/drawing/2014/main" id="{25A49919-7E0E-4C7D-B927-9BBC1B88F02D}"/>
               </a:ext>
             </a:extLst>
           </p:cNvPr>
@@ -10673,14 +11223,16 @@
       </p:sp>
       <p:pic>
         <p:nvPicPr>
-          <p:cNvPr id="5" name="Image 4">
+          <p:cNvPr id="8" name="Image 7">
             <a:extLst>
               <a:ext uri="{FF2B5EF4-FFF2-40B4-BE49-F238E27FC236}">
-                <a16:creationId xmlns:a16="http://schemas.microsoft.com/office/drawing/2014/main" id="{61117EDE-6840-4C0F-A1CF-4280489DC906}"/>
+                <a16:creationId xmlns:a16="http://schemas.microsoft.com/office/drawing/2014/main" id="{B255A0F8-887E-4480-8954-5FAE0303AD62}"/>
               </a:ext>
             </a:extLst>
           </p:cNvPr>
-          <p:cNvPicPr/>
+          <p:cNvPicPr>
+            <a:picLocks noChangeAspect="1"/>
+          </p:cNvPicPr>
           <p:nvPr/>
         </p:nvPicPr>
         <p:blipFill>
@@ -10691,58 +11243,18 @@
         </p:blipFill>
         <p:spPr>
           <a:xfrm>
-            <a:off x="2561299" y="1823570"/>
-            <a:ext cx="5760720" cy="4133215"/>
+            <a:off x="1070583" y="2691767"/>
+            <a:ext cx="10050834" cy="1474466"/>
           </a:xfrm>
           <a:prstGeom prst="rect">
             <a:avLst/>
           </a:prstGeom>
         </p:spPr>
       </p:pic>
-      <p:sp>
-        <p:nvSpPr>
-          <p:cNvPr id="8" name="ZoneTexte 7">
-            <a:extLst>
-              <a:ext uri="{FF2B5EF4-FFF2-40B4-BE49-F238E27FC236}">
-                <a16:creationId xmlns:a16="http://schemas.microsoft.com/office/drawing/2014/main" id="{2C78126C-9B76-4F1C-B1B3-2C5F4518349E}"/>
-              </a:ext>
-            </a:extLst>
-          </p:cNvPr>
-          <p:cNvSpPr txBox="1"/>
-          <p:nvPr/>
-        </p:nvSpPr>
-        <p:spPr>
-          <a:xfrm>
-            <a:off x="2815905" y="1258827"/>
-            <a:ext cx="5251508" cy="369332"/>
-          </a:xfrm>
-          <a:prstGeom prst="rect">
-            <a:avLst/>
-          </a:prstGeom>
-          <a:noFill/>
-        </p:spPr>
-        <p:txBody>
-          <a:bodyPr wrap="square" rtlCol="0">
-            <a:spAutoFit/>
-          </a:bodyPr>
-          <a:lstStyle/>
-          <a:p>
-            <a:pPr algn="ctr"/>
-            <a:r>
-              <a:rPr lang="fr-FR" dirty="0"/>
-              <a:t>Groupe de sécurité pour la </a:t>
-            </a:r>
-            <a:r>
-              <a:rPr lang="fr-FR" b="1" dirty="0"/>
-              <a:t>machine 1 EC2</a:t>
-            </a:r>
-          </a:p>
-        </p:txBody>
-      </p:sp>
     </p:spTree>
     <p:extLst>
       <p:ext uri="{BB962C8B-B14F-4D97-AF65-F5344CB8AC3E}">
-        <p14:creationId xmlns:p14="http://schemas.microsoft.com/office/powerpoint/2010/main" val="1544484119"/>
+        <p14:creationId xmlns:p14="http://schemas.microsoft.com/office/powerpoint/2010/main" val="462906599"/>
       </p:ext>
     </p:extLst>
   </p:cSld>
@@ -10836,52 +11348,12 @@
           </a:p>
         </p:txBody>
       </p:sp>
-      <p:sp>
-        <p:nvSpPr>
-          <p:cNvPr id="8" name="ZoneTexte 7">
-            <a:extLst>
-              <a:ext uri="{FF2B5EF4-FFF2-40B4-BE49-F238E27FC236}">
-                <a16:creationId xmlns:a16="http://schemas.microsoft.com/office/drawing/2014/main" id="{2C78126C-9B76-4F1C-B1B3-2C5F4518349E}"/>
-              </a:ext>
-            </a:extLst>
-          </p:cNvPr>
-          <p:cNvSpPr txBox="1"/>
-          <p:nvPr/>
-        </p:nvSpPr>
-        <p:spPr>
-          <a:xfrm>
-            <a:off x="2815905" y="1258827"/>
-            <a:ext cx="5251508" cy="369332"/>
-          </a:xfrm>
-          <a:prstGeom prst="rect">
-            <a:avLst/>
-          </a:prstGeom>
-          <a:noFill/>
-        </p:spPr>
-        <p:txBody>
-          <a:bodyPr wrap="square" rtlCol="0">
-            <a:spAutoFit/>
-          </a:bodyPr>
-          <a:lstStyle/>
-          <a:p>
-            <a:pPr algn="ctr"/>
-            <a:r>
-              <a:rPr lang="fr-FR" dirty="0"/>
-              <a:t>Groupe de sécurité pour la </a:t>
-            </a:r>
-            <a:r>
-              <a:rPr lang="fr-FR" b="1" dirty="0"/>
-              <a:t>machine 2 EC2</a:t>
-            </a:r>
-          </a:p>
-        </p:txBody>
-      </p:sp>
       <p:pic>
         <p:nvPicPr>
-          <p:cNvPr id="6" name="Image 5">
+          <p:cNvPr id="5" name="Image 4">
             <a:extLst>
               <a:ext uri="{FF2B5EF4-FFF2-40B4-BE49-F238E27FC236}">
-                <a16:creationId xmlns:a16="http://schemas.microsoft.com/office/drawing/2014/main" id="{9FD9E764-29F9-4F73-AA55-F22814711996}"/>
+                <a16:creationId xmlns:a16="http://schemas.microsoft.com/office/drawing/2014/main" id="{61117EDE-6840-4C0F-A1CF-4280489DC906}"/>
               </a:ext>
             </a:extLst>
           </p:cNvPr>
@@ -10896,18 +11368,58 @@
         </p:blipFill>
         <p:spPr>
           <a:xfrm>
-            <a:off x="1796502" y="1823570"/>
-            <a:ext cx="7290313" cy="4417839"/>
+            <a:off x="2561299" y="1823570"/>
+            <a:ext cx="5760720" cy="4133215"/>
           </a:xfrm>
           <a:prstGeom prst="rect">
             <a:avLst/>
           </a:prstGeom>
         </p:spPr>
       </p:pic>
+      <p:sp>
+        <p:nvSpPr>
+          <p:cNvPr id="8" name="ZoneTexte 7">
+            <a:extLst>
+              <a:ext uri="{FF2B5EF4-FFF2-40B4-BE49-F238E27FC236}">
+                <a16:creationId xmlns:a16="http://schemas.microsoft.com/office/drawing/2014/main" id="{2C78126C-9B76-4F1C-B1B3-2C5F4518349E}"/>
+              </a:ext>
+            </a:extLst>
+          </p:cNvPr>
+          <p:cNvSpPr txBox="1"/>
+          <p:nvPr/>
+        </p:nvSpPr>
+        <p:spPr>
+          <a:xfrm>
+            <a:off x="2815905" y="1258827"/>
+            <a:ext cx="5251508" cy="369332"/>
+          </a:xfrm>
+          <a:prstGeom prst="rect">
+            <a:avLst/>
+          </a:prstGeom>
+          <a:noFill/>
+        </p:spPr>
+        <p:txBody>
+          <a:bodyPr wrap="square" rtlCol="0">
+            <a:spAutoFit/>
+          </a:bodyPr>
+          <a:lstStyle/>
+          <a:p>
+            <a:pPr algn="ctr"/>
+            <a:r>
+              <a:rPr lang="fr-FR" dirty="0"/>
+              <a:t>Groupe de sécurité pour la </a:t>
+            </a:r>
+            <a:r>
+              <a:rPr lang="fr-FR" b="1" dirty="0"/>
+              <a:t>machine 1 EC2</a:t>
+            </a:r>
+          </a:p>
+        </p:txBody>
+      </p:sp>
     </p:spTree>
     <p:extLst>
       <p:ext uri="{BB962C8B-B14F-4D97-AF65-F5344CB8AC3E}">
-        <p14:creationId xmlns:p14="http://schemas.microsoft.com/office/powerpoint/2010/main" val="1960733067"/>
+        <p14:creationId xmlns:p14="http://schemas.microsoft.com/office/powerpoint/2010/main" val="1544484119"/>
       </p:ext>
     </p:extLst>
   </p:cSld>
@@ -11036,15 +11548,7 @@
             </a:r>
             <a:r>
               <a:rPr lang="fr-FR" b="1" dirty="0"/>
-              <a:t>BDD </a:t>
-            </a:r>
-            <a:r>
-              <a:rPr lang="fr-FR" b="1" dirty="0" err="1"/>
-              <a:t>mysql</a:t>
-            </a:r>
-            <a:r>
-              <a:rPr lang="fr-FR" b="1" dirty="0"/>
-              <a:t> - RDS</a:t>
+              <a:t>machine 2 EC2</a:t>
             </a:r>
           </a:p>
         </p:txBody>
@@ -11054,7 +11558,7 @@
           <p:cNvPr id="6" name="Image 5">
             <a:extLst>
               <a:ext uri="{FF2B5EF4-FFF2-40B4-BE49-F238E27FC236}">
-                <a16:creationId xmlns:a16="http://schemas.microsoft.com/office/drawing/2014/main" id="{2E667933-1522-4C97-9A19-4771A594FED4}"/>
+                <a16:creationId xmlns:a16="http://schemas.microsoft.com/office/drawing/2014/main" id="{9FD9E764-29F9-4F73-AA55-F22814711996}"/>
               </a:ext>
             </a:extLst>
           </p:cNvPr>
@@ -11069,65 +11573,18 @@
         </p:blipFill>
         <p:spPr>
           <a:xfrm>
-            <a:off x="1621731" y="1971690"/>
-            <a:ext cx="7614547" cy="3867048"/>
+            <a:off x="1796502" y="1823570"/>
+            <a:ext cx="7290313" cy="4417839"/>
           </a:xfrm>
           <a:prstGeom prst="rect">
             <a:avLst/>
           </a:prstGeom>
         </p:spPr>
       </p:pic>
-      <p:sp>
-        <p:nvSpPr>
-          <p:cNvPr id="3" name="Rectangle 2">
-            <a:extLst>
-              <a:ext uri="{FF2B5EF4-FFF2-40B4-BE49-F238E27FC236}">
-                <a16:creationId xmlns:a16="http://schemas.microsoft.com/office/drawing/2014/main" id="{3EC89D89-C745-4FDB-B128-154A4BB4EA22}"/>
-              </a:ext>
-            </a:extLst>
-          </p:cNvPr>
-          <p:cNvSpPr/>
-          <p:nvPr/>
-        </p:nvSpPr>
-        <p:spPr>
-          <a:xfrm>
-            <a:off x="1770077" y="5478012"/>
-            <a:ext cx="5471020" cy="251670"/>
-          </a:xfrm>
-          <a:prstGeom prst="rect">
-            <a:avLst/>
-          </a:prstGeom>
-          <a:noFill/>
-        </p:spPr>
-        <p:style>
-          <a:lnRef idx="2">
-            <a:schemeClr val="accent1">
-              <a:shade val="50000"/>
-            </a:schemeClr>
-          </a:lnRef>
-          <a:fillRef idx="1">
-            <a:schemeClr val="accent1"/>
-          </a:fillRef>
-          <a:effectRef idx="0">
-            <a:schemeClr val="accent1"/>
-          </a:effectRef>
-          <a:fontRef idx="minor">
-            <a:schemeClr val="lt1"/>
-          </a:fontRef>
-        </p:style>
-        <p:txBody>
-          <a:bodyPr rtlCol="0" anchor="ctr"/>
-          <a:lstStyle/>
-          <a:p>
-            <a:pPr algn="ctr"/>
-            <a:endParaRPr lang="fr-FR"/>
-          </a:p>
-        </p:txBody>
-      </p:sp>
     </p:spTree>
     <p:extLst>
       <p:ext uri="{BB962C8B-B14F-4D97-AF65-F5344CB8AC3E}">
-        <p14:creationId xmlns:p14="http://schemas.microsoft.com/office/powerpoint/2010/main" val="700678197"/>
+        <p14:creationId xmlns:p14="http://schemas.microsoft.com/office/powerpoint/2010/main" val="1960733067"/>
       </p:ext>
     </p:extLst>
   </p:cSld>
@@ -11159,7 +11616,7 @@
           <p:cNvPr id="2" name="Titre 1">
             <a:extLst>
               <a:ext uri="{FF2B5EF4-FFF2-40B4-BE49-F238E27FC236}">
-                <a16:creationId xmlns:a16="http://schemas.microsoft.com/office/drawing/2014/main" id="{21C49D9F-2F87-473F-901C-D62E61096A4F}"/>
+                <a16:creationId xmlns:a16="http://schemas.microsoft.com/office/drawing/2014/main" id="{0D7F41CD-C7AA-4336-9030-C02371A659E1}"/>
               </a:ext>
             </a:extLst>
           </p:cNvPr>
@@ -11172,8 +11629,8 @@
         </p:nvSpPr>
         <p:spPr>
           <a:xfrm>
-            <a:off x="646111" y="452718"/>
-            <a:ext cx="9404723" cy="767687"/>
+            <a:off x="629334" y="148728"/>
+            <a:ext cx="9404723" cy="914688"/>
           </a:xfrm>
         </p:spPr>
         <p:txBody>
@@ -11183,15 +11640,7 @@
             <a:pPr algn="ctr"/>
             <a:r>
               <a:rPr lang="fr-FR" b="1" dirty="0"/>
-              <a:t>Création du </a:t>
-            </a:r>
-            <a:r>
-              <a:rPr lang="fr-FR" b="1" dirty="0" err="1"/>
-              <a:t>bucket</a:t>
-            </a:r>
-            <a:r>
-              <a:rPr lang="fr-FR" b="1" dirty="0"/>
-              <a:t> S3</a:t>
+              <a:t>Groupes de sécurités</a:t>
             </a:r>
             <a:br>
               <a:rPr lang="fr-FR" b="1" dirty="0"/>
@@ -11205,7 +11654,7 @@
           <p:cNvPr id="4" name="Espace réservé du numéro de diapositive 3">
             <a:extLst>
               <a:ext uri="{FF2B5EF4-FFF2-40B4-BE49-F238E27FC236}">
-                <a16:creationId xmlns:a16="http://schemas.microsoft.com/office/drawing/2014/main" id="{36C03306-9D3F-48EE-819B-32448FB9F7A5}"/>
+                <a16:creationId xmlns:a16="http://schemas.microsoft.com/office/drawing/2014/main" id="{DA3A3848-0889-425E-B4CF-707327F425F1}"/>
               </a:ext>
             </a:extLst>
           </p:cNvPr>
@@ -11229,12 +11678,60 @@
           </a:p>
         </p:txBody>
       </p:sp>
+      <p:sp>
+        <p:nvSpPr>
+          <p:cNvPr id="8" name="ZoneTexte 7">
+            <a:extLst>
+              <a:ext uri="{FF2B5EF4-FFF2-40B4-BE49-F238E27FC236}">
+                <a16:creationId xmlns:a16="http://schemas.microsoft.com/office/drawing/2014/main" id="{2C78126C-9B76-4F1C-B1B3-2C5F4518349E}"/>
+              </a:ext>
+            </a:extLst>
+          </p:cNvPr>
+          <p:cNvSpPr txBox="1"/>
+          <p:nvPr/>
+        </p:nvSpPr>
+        <p:spPr>
+          <a:xfrm>
+            <a:off x="2815905" y="1258827"/>
+            <a:ext cx="5251508" cy="369332"/>
+          </a:xfrm>
+          <a:prstGeom prst="rect">
+            <a:avLst/>
+          </a:prstGeom>
+          <a:noFill/>
+        </p:spPr>
+        <p:txBody>
+          <a:bodyPr wrap="square" rtlCol="0">
+            <a:spAutoFit/>
+          </a:bodyPr>
+          <a:lstStyle/>
+          <a:p>
+            <a:pPr algn="ctr"/>
+            <a:r>
+              <a:rPr lang="fr-FR" dirty="0"/>
+              <a:t>Groupe de sécurité pour la </a:t>
+            </a:r>
+            <a:r>
+              <a:rPr lang="fr-FR" b="1" dirty="0"/>
+              <a:t>BDD </a:t>
+            </a:r>
+            <a:r>
+              <a:rPr lang="fr-FR" b="1" dirty="0" err="1"/>
+              <a:t>mysql</a:t>
+            </a:r>
+            <a:r>
+              <a:rPr lang="fr-FR" b="1" dirty="0"/>
+              <a:t> - RDS</a:t>
+            </a:r>
+          </a:p>
+        </p:txBody>
+      </p:sp>
       <p:pic>
         <p:nvPicPr>
-          <p:cNvPr id="7" name="Image 6">
+          <p:cNvPr id="6" name="Image 5">
             <a:extLst>
               <a:ext uri="{FF2B5EF4-FFF2-40B4-BE49-F238E27FC236}">
-                <a16:creationId xmlns:a16="http://schemas.microsoft.com/office/drawing/2014/main" id="{3E90834A-88DF-48B4-AB07-75BD47F5DA65}"/>
+                <a16:creationId xmlns:a16="http://schemas.microsoft.com/office/drawing/2014/main" id="{2E667933-1522-4C97-9A19-4771A594FED4}"/>
               </a:ext>
             </a:extLst>
           </p:cNvPr>
@@ -11249,46 +11746,65 @@
         </p:blipFill>
         <p:spPr>
           <a:xfrm>
-            <a:off x="409924" y="2264618"/>
-            <a:ext cx="6028198" cy="3486474"/>
+            <a:off x="1621731" y="1971690"/>
+            <a:ext cx="7614547" cy="3867048"/>
           </a:xfrm>
           <a:prstGeom prst="rect">
             <a:avLst/>
           </a:prstGeom>
         </p:spPr>
       </p:pic>
-      <p:pic>
-        <p:nvPicPr>
-          <p:cNvPr id="8" name="Image 7">
+      <p:sp>
+        <p:nvSpPr>
+          <p:cNvPr id="3" name="Rectangle 2">
             <a:extLst>
               <a:ext uri="{FF2B5EF4-FFF2-40B4-BE49-F238E27FC236}">
-                <a16:creationId xmlns:a16="http://schemas.microsoft.com/office/drawing/2014/main" id="{81DF5C94-C967-47C7-847C-F8621CEC1DBF}"/>
+                <a16:creationId xmlns:a16="http://schemas.microsoft.com/office/drawing/2014/main" id="{3EC89D89-C745-4FDB-B128-154A4BB4EA22}"/>
               </a:ext>
             </a:extLst>
           </p:cNvPr>
-          <p:cNvPicPr/>
+          <p:cNvSpPr/>
           <p:nvPr/>
-        </p:nvPicPr>
-        <p:blipFill>
-          <a:blip r:embed="rId3"/>
-          <a:stretch>
-            <a:fillRect/>
-          </a:stretch>
-        </p:blipFill>
-        <p:spPr>
-          <a:xfrm>
-            <a:off x="6969967" y="1668548"/>
-            <a:ext cx="4709472" cy="4893723"/>
+        </p:nvSpPr>
+        <p:spPr>
+          <a:xfrm>
+            <a:off x="1770077" y="5478012"/>
+            <a:ext cx="5471020" cy="251670"/>
           </a:xfrm>
           <a:prstGeom prst="rect">
             <a:avLst/>
           </a:prstGeom>
-        </p:spPr>
-      </p:pic>
+          <a:noFill/>
+        </p:spPr>
+        <p:style>
+          <a:lnRef idx="2">
+            <a:schemeClr val="accent1">
+              <a:shade val="50000"/>
+            </a:schemeClr>
+          </a:lnRef>
+          <a:fillRef idx="1">
+            <a:schemeClr val="accent1"/>
+          </a:fillRef>
+          <a:effectRef idx="0">
+            <a:schemeClr val="accent1"/>
+          </a:effectRef>
+          <a:fontRef idx="minor">
+            <a:schemeClr val="lt1"/>
+          </a:fontRef>
+        </p:style>
+        <p:txBody>
+          <a:bodyPr rtlCol="0" anchor="ctr"/>
+          <a:lstStyle/>
+          <a:p>
+            <a:pPr algn="ctr"/>
+            <a:endParaRPr lang="fr-FR"/>
+          </a:p>
+        </p:txBody>
+      </p:sp>
     </p:spTree>
     <p:extLst>
       <p:ext uri="{BB962C8B-B14F-4D97-AF65-F5344CB8AC3E}">
-        <p14:creationId xmlns:p14="http://schemas.microsoft.com/office/powerpoint/2010/main" val="3847817708"/>
+        <p14:creationId xmlns:p14="http://schemas.microsoft.com/office/powerpoint/2010/main" val="700678197"/>
       </p:ext>
     </p:extLst>
   </p:cSld>
@@ -11333,7 +11849,7 @@
         </p:nvSpPr>
         <p:spPr>
           <a:xfrm>
-            <a:off x="947817" y="368828"/>
+            <a:off x="646111" y="452718"/>
             <a:ext cx="9404723" cy="767687"/>
           </a:xfrm>
         </p:spPr>
@@ -11392,10 +11908,10 @@
       </p:sp>
       <p:pic>
         <p:nvPicPr>
-          <p:cNvPr id="6" name="Image 5">
+          <p:cNvPr id="7" name="Image 6">
             <a:extLst>
               <a:ext uri="{FF2B5EF4-FFF2-40B4-BE49-F238E27FC236}">
-                <a16:creationId xmlns:a16="http://schemas.microsoft.com/office/drawing/2014/main" id="{17DCC8C1-CA9B-419C-810E-651408F419BF}"/>
+                <a16:creationId xmlns:a16="http://schemas.microsoft.com/office/drawing/2014/main" id="{3E90834A-88DF-48B4-AB07-75BD47F5DA65}"/>
               </a:ext>
             </a:extLst>
           </p:cNvPr>
@@ -11410,8 +11926,38 @@
         </p:blipFill>
         <p:spPr>
           <a:xfrm>
-            <a:off x="1427577" y="1655580"/>
-            <a:ext cx="9336845" cy="3546839"/>
+            <a:off x="409924" y="2264618"/>
+            <a:ext cx="6028198" cy="3486474"/>
+          </a:xfrm>
+          <a:prstGeom prst="rect">
+            <a:avLst/>
+          </a:prstGeom>
+        </p:spPr>
+      </p:pic>
+      <p:pic>
+        <p:nvPicPr>
+          <p:cNvPr id="3" name="Image 2">
+            <a:extLst>
+              <a:ext uri="{FF2B5EF4-FFF2-40B4-BE49-F238E27FC236}">
+                <a16:creationId xmlns:a16="http://schemas.microsoft.com/office/drawing/2014/main" id="{B009DC88-F94C-4F42-870B-38B9309789F8}"/>
+              </a:ext>
+            </a:extLst>
+          </p:cNvPr>
+          <p:cNvPicPr>
+            <a:picLocks noChangeAspect="1"/>
+          </p:cNvPicPr>
+          <p:nvPr/>
+        </p:nvPicPr>
+        <p:blipFill>
+          <a:blip r:embed="rId3"/>
+          <a:stretch>
+            <a:fillRect/>
+          </a:stretch>
+        </p:blipFill>
+        <p:spPr>
+          <a:xfrm>
+            <a:off x="6681937" y="2136710"/>
+            <a:ext cx="5277632" cy="3848695"/>
           </a:xfrm>
           <a:prstGeom prst="rect">
             <a:avLst/>
@@ -11421,7 +11967,7 @@
     </p:spTree>
     <p:extLst>
       <p:ext uri="{BB962C8B-B14F-4D97-AF65-F5344CB8AC3E}">
-        <p14:creationId xmlns:p14="http://schemas.microsoft.com/office/powerpoint/2010/main" val="3576209573"/>
+        <p14:creationId xmlns:p14="http://schemas.microsoft.com/office/powerpoint/2010/main" val="3847817708"/>
       </p:ext>
     </p:extLst>
   </p:cSld>
@@ -11434,30 +11980,6 @@
 <file path=ppt/slides/slide9.xml><?xml version="1.0" encoding="utf-8"?>
 <p:sld xmlns:a="http://schemas.openxmlformats.org/drawingml/2006/main" xmlns:r="http://schemas.openxmlformats.org/officeDocument/2006/relationships" xmlns:p="http://schemas.openxmlformats.org/presentationml/2006/main">
   <p:cSld>
-    <p:bg>
-      <p:bgPr>
-        <a:blipFill rotWithShape="1">
-          <a:blip r:embed="rId2">
-            <a:duotone>
-              <a:schemeClr val="bg2">
-                <a:shade val="69000"/>
-                <a:hueMod val="108000"/>
-                <a:satMod val="164000"/>
-                <a:lumMod val="74000"/>
-              </a:schemeClr>
-              <a:schemeClr val="bg2">
-                <a:tint val="96000"/>
-                <a:hueMod val="88000"/>
-                <a:satMod val="140000"/>
-                <a:lumMod val="132000"/>
-              </a:schemeClr>
-            </a:duotone>
-          </a:blip>
-          <a:stretch/>
-        </a:blipFill>
-        <a:effectLst/>
-      </p:bgPr>
-    </p:bg>
     <p:spTree>
       <p:nvGrpSpPr>
         <p:cNvPr id="1" name=""/>
@@ -11472,419 +11994,87 @@
           <a:chExt cx="0" cy="0"/>
         </a:xfrm>
       </p:grpSpPr>
+      <p:sp>
+        <p:nvSpPr>
+          <p:cNvPr id="2" name="Titre 1">
+            <a:extLst>
+              <a:ext uri="{FF2B5EF4-FFF2-40B4-BE49-F238E27FC236}">
+                <a16:creationId xmlns:a16="http://schemas.microsoft.com/office/drawing/2014/main" id="{21C49D9F-2F87-473F-901C-D62E61096A4F}"/>
+              </a:ext>
+            </a:extLst>
+          </p:cNvPr>
+          <p:cNvSpPr>
+            <a:spLocks noGrp="1"/>
+          </p:cNvSpPr>
+          <p:nvPr>
+            <p:ph type="title"/>
+          </p:nvPr>
+        </p:nvSpPr>
+        <p:spPr>
+          <a:xfrm>
+            <a:off x="947817" y="368828"/>
+            <a:ext cx="9404723" cy="767687"/>
+          </a:xfrm>
+        </p:spPr>
+        <p:txBody>
+          <a:bodyPr/>
+          <a:lstStyle/>
+          <a:p>
+            <a:pPr algn="ctr"/>
+            <a:r>
+              <a:rPr lang="fr-FR" b="1" dirty="0"/>
+              <a:t>Création du </a:t>
+            </a:r>
+            <a:r>
+              <a:rPr lang="fr-FR" b="1" dirty="0" err="1"/>
+              <a:t>bucket</a:t>
+            </a:r>
+            <a:r>
+              <a:rPr lang="fr-FR" b="1" dirty="0"/>
+              <a:t> S3</a:t>
+            </a:r>
+            <a:br>
+              <a:rPr lang="fr-FR" b="1" dirty="0"/>
+            </a:br>
+            <a:endParaRPr lang="fr-FR" b="1" dirty="0"/>
+          </a:p>
+        </p:txBody>
+      </p:sp>
+      <p:sp>
+        <p:nvSpPr>
+          <p:cNvPr id="4" name="Espace réservé du numéro de diapositive 3">
+            <a:extLst>
+              <a:ext uri="{FF2B5EF4-FFF2-40B4-BE49-F238E27FC236}">
+                <a16:creationId xmlns:a16="http://schemas.microsoft.com/office/drawing/2014/main" id="{36C03306-9D3F-48EE-819B-32448FB9F7A5}"/>
+              </a:ext>
+            </a:extLst>
+          </p:cNvPr>
+          <p:cNvSpPr>
+            <a:spLocks noGrp="1"/>
+          </p:cNvSpPr>
+          <p:nvPr>
+            <p:ph type="sldNum" sz="quarter" idx="12"/>
+          </p:nvPr>
+        </p:nvSpPr>
+        <p:spPr/>
+        <p:txBody>
+          <a:bodyPr/>
+          <a:lstStyle/>
+          <a:p>
+            <a:fld id="{D57F1E4F-1CFF-5643-939E-02111984F565}" type="slidenum">
+              <a:rPr lang="en-US" smtClean="0"/>
+              <a:t>9</a:t>
+            </a:fld>
+            <a:endParaRPr lang="en-US" dirty="0"/>
+          </a:p>
+        </p:txBody>
+      </p:sp>
       <p:pic>
         <p:nvPicPr>
-          <p:cNvPr id="10" name="Picture 9">
+          <p:cNvPr id="6" name="Image 5">
             <a:extLst>
               <a:ext uri="{FF2B5EF4-FFF2-40B4-BE49-F238E27FC236}">
-                <a16:creationId xmlns:a16="http://schemas.microsoft.com/office/drawing/2014/main" id="{41B68C77-138E-4BF7-A276-BD0C78A4219F}"/>
-              </a:ext>
-              <a:ext uri="{C183D7F6-B498-43B3-948B-1728B52AA6E4}">
-                <adec:decorative xmlns:adec="http://schemas.microsoft.com/office/drawing/2017/decorative" val="1"/>
-              </a:ext>
-            </a:extLst>
-          </p:cNvPr>
-          <p:cNvPicPr>
-            <a:picLocks noGrp="1" noRot="1" noChangeAspect="1" noMove="1" noResize="1" noEditPoints="1" noAdjustHandles="1" noChangeArrowheads="1" noChangeShapeType="1" noCrop="1"/>
-          </p:cNvPicPr>
-          <p:nvPr>
-            <p:extLst>
-              <p:ext uri="{386F3935-93C4-4BCD-93E2-E3B085C9AB24}">
-                <p16:designElem xmlns:p16="http://schemas.microsoft.com/office/powerpoint/2015/main" val="1"/>
-              </p:ext>
-            </p:extLst>
-          </p:nvPr>
-        </p:nvPicPr>
-        <p:blipFill rotWithShape="1">
-          <a:blip r:embed="rId3">
-            <a:extLst>
-              <a:ext uri="{28A0092B-C50C-407E-A947-70E740481C1C}">
-                <a14:useLocalDpi xmlns:a14="http://schemas.microsoft.com/office/drawing/2010/main" val="0"/>
-              </a:ext>
-            </a:extLst>
-          </a:blip>
-          <a:srcRect l="3613"/>
-          <a:stretch/>
-        </p:blipFill>
-        <p:spPr>
-          <a:xfrm>
-            <a:off x="0" y="2669685"/>
-            <a:ext cx="4037012" cy="4188315"/>
-          </a:xfrm>
-          <a:prstGeom prst="rect">
-            <a:avLst/>
-          </a:prstGeom>
-        </p:spPr>
-      </p:pic>
-      <p:pic>
-        <p:nvPicPr>
-          <p:cNvPr id="12" name="Picture 11">
-            <a:extLst>
-              <a:ext uri="{FF2B5EF4-FFF2-40B4-BE49-F238E27FC236}">
-                <a16:creationId xmlns:a16="http://schemas.microsoft.com/office/drawing/2014/main" id="{7C268552-D473-46ED-B1B8-422042C4DEF1}"/>
-              </a:ext>
-              <a:ext uri="{C183D7F6-B498-43B3-948B-1728B52AA6E4}">
-                <adec:decorative xmlns:adec="http://schemas.microsoft.com/office/drawing/2017/decorative" val="1"/>
-              </a:ext>
-            </a:extLst>
-          </p:cNvPr>
-          <p:cNvPicPr>
-            <a:picLocks noGrp="1" noRot="1" noChangeAspect="1" noMove="1" noResize="1" noEditPoints="1" noAdjustHandles="1" noChangeArrowheads="1" noChangeShapeType="1" noCrop="1"/>
-          </p:cNvPicPr>
-          <p:nvPr>
-            <p:extLst>
-              <p:ext uri="{386F3935-93C4-4BCD-93E2-E3B085C9AB24}">
-                <p16:designElem xmlns:p16="http://schemas.microsoft.com/office/powerpoint/2015/main" val="1"/>
-              </p:ext>
-            </p:extLst>
-          </p:nvPr>
-        </p:nvPicPr>
-        <p:blipFill rotWithShape="1">
-          <a:blip r:embed="rId4">
-            <a:extLst>
-              <a:ext uri="{28A0092B-C50C-407E-A947-70E740481C1C}">
-                <a14:useLocalDpi xmlns:a14="http://schemas.microsoft.com/office/drawing/2010/main" val="0"/>
-              </a:ext>
-            </a:extLst>
-          </a:blip>
-          <a:srcRect l="35640"/>
-          <a:stretch/>
-        </p:blipFill>
-        <p:spPr>
-          <a:xfrm>
-            <a:off x="0" y="2892347"/>
-            <a:ext cx="1522412" cy="2365453"/>
-          </a:xfrm>
-          <a:prstGeom prst="rect">
-            <a:avLst/>
-          </a:prstGeom>
-        </p:spPr>
-      </p:pic>
-      <p:sp>
-        <p:nvSpPr>
-          <p:cNvPr id="14" name="Oval 13">
-            <a:extLst>
-              <a:ext uri="{FF2B5EF4-FFF2-40B4-BE49-F238E27FC236}">
-                <a16:creationId xmlns:a16="http://schemas.microsoft.com/office/drawing/2014/main" id="{4AC0CD9D-7610-4620-93B4-798CCD9AB581}"/>
-              </a:ext>
-              <a:ext uri="{C183D7F6-B498-43B3-948B-1728B52AA6E4}">
-                <adec:decorative xmlns:adec="http://schemas.microsoft.com/office/drawing/2017/decorative" val="1"/>
-              </a:ext>
-            </a:extLst>
-          </p:cNvPr>
-          <p:cNvSpPr>
-            <a:spLocks noGrp="1" noRot="1" noChangeAspect="1" noMove="1" noResize="1" noEditPoints="1" noAdjustHandles="1" noChangeArrowheads="1" noChangeShapeType="1" noTextEdit="1"/>
-          </p:cNvSpPr>
-          <p:nvPr>
-            <p:extLst>
-              <p:ext uri="{386F3935-93C4-4BCD-93E2-E3B085C9AB24}">
-                <p16:designElem xmlns:p16="http://schemas.microsoft.com/office/powerpoint/2015/main" val="1"/>
-              </p:ext>
-            </p:extLst>
-          </p:nvPr>
-        </p:nvSpPr>
-        <p:spPr>
-          <a:xfrm>
-            <a:off x="8609012" y="1676400"/>
-            <a:ext cx="2819400" cy="2819400"/>
-          </a:xfrm>
-          <a:prstGeom prst="ellipse">
-            <a:avLst/>
-          </a:prstGeom>
-          <a:gradFill flip="none" rotWithShape="1">
-            <a:gsLst>
-              <a:gs pos="0">
-                <a:schemeClr val="bg2">
-                  <a:lumMod val="60000"/>
-                  <a:lumOff val="40000"/>
-                  <a:alpha val="7000"/>
-                </a:schemeClr>
-              </a:gs>
-              <a:gs pos="69000">
-                <a:schemeClr val="bg2">
-                  <a:lumMod val="60000"/>
-                  <a:lumOff val="40000"/>
-                  <a:alpha val="0"/>
-                </a:schemeClr>
-              </a:gs>
-              <a:gs pos="36000">
-                <a:schemeClr val="bg2">
-                  <a:lumMod val="60000"/>
-                  <a:lumOff val="40000"/>
-                  <a:alpha val="6000"/>
-                </a:schemeClr>
-              </a:gs>
-            </a:gsLst>
-            <a:path path="circle">
-              <a:fillToRect l="50000" t="50000" r="50000" b="50000"/>
-            </a:path>
-            <a:tileRect/>
-          </a:gradFill>
-          <a:ln>
-            <a:noFill/>
-          </a:ln>
-          <a:effectLst/>
-        </p:spPr>
-        <p:style>
-          <a:lnRef idx="1">
-            <a:schemeClr val="accent1"/>
-          </a:lnRef>
-          <a:fillRef idx="3">
-            <a:schemeClr val="accent1"/>
-          </a:fillRef>
-          <a:effectRef idx="2">
-            <a:schemeClr val="accent1"/>
-          </a:effectRef>
-          <a:fontRef idx="minor">
-            <a:schemeClr val="lt1"/>
-          </a:fontRef>
-        </p:style>
-      </p:sp>
-      <p:pic>
-        <p:nvPicPr>
-          <p:cNvPr id="16" name="Picture 15">
-            <a:extLst>
-              <a:ext uri="{FF2B5EF4-FFF2-40B4-BE49-F238E27FC236}">
-                <a16:creationId xmlns:a16="http://schemas.microsoft.com/office/drawing/2014/main" id="{B9238B3E-24AA-439A-B527-6C5DF6D72145}"/>
-              </a:ext>
-              <a:ext uri="{C183D7F6-B498-43B3-948B-1728B52AA6E4}">
-                <adec:decorative xmlns:adec="http://schemas.microsoft.com/office/drawing/2017/decorative" val="1"/>
-              </a:ext>
-            </a:extLst>
-          </p:cNvPr>
-          <p:cNvPicPr>
-            <a:picLocks noGrp="1" noRot="1" noChangeAspect="1" noMove="1" noResize="1" noEditPoints="1" noAdjustHandles="1" noChangeArrowheads="1" noChangeShapeType="1" noCrop="1"/>
-          </p:cNvPicPr>
-          <p:nvPr>
-            <p:extLst>
-              <p:ext uri="{386F3935-93C4-4BCD-93E2-E3B085C9AB24}">
-                <p16:designElem xmlns:p16="http://schemas.microsoft.com/office/powerpoint/2015/main" val="1"/>
-              </p:ext>
-            </p:extLst>
-          </p:nvPr>
-        </p:nvPicPr>
-        <p:blipFill rotWithShape="1">
-          <a:blip r:embed="rId5">
-            <a:extLst>
-              <a:ext uri="{28A0092B-C50C-407E-A947-70E740481C1C}">
-                <a14:useLocalDpi xmlns:a14="http://schemas.microsoft.com/office/drawing/2010/main" val="0"/>
-              </a:ext>
-            </a:extLst>
-          </a:blip>
-          <a:srcRect t="28813"/>
-          <a:stretch/>
-        </p:blipFill>
-        <p:spPr>
-          <a:xfrm>
-            <a:off x="7999412" y="0"/>
-            <a:ext cx="1603387" cy="1141407"/>
-          </a:xfrm>
-          <a:prstGeom prst="rect">
-            <a:avLst/>
-          </a:prstGeom>
-        </p:spPr>
-      </p:pic>
-      <p:pic>
-        <p:nvPicPr>
-          <p:cNvPr id="18" name="Picture 17">
-            <a:extLst>
-              <a:ext uri="{FF2B5EF4-FFF2-40B4-BE49-F238E27FC236}">
-                <a16:creationId xmlns:a16="http://schemas.microsoft.com/office/drawing/2014/main" id="{69F01145-BEA3-4CBF-AA21-10077B948CA8}"/>
-              </a:ext>
-              <a:ext uri="{C183D7F6-B498-43B3-948B-1728B52AA6E4}">
-                <adec:decorative xmlns:adec="http://schemas.microsoft.com/office/drawing/2017/decorative" val="1"/>
-              </a:ext>
-            </a:extLst>
-          </p:cNvPr>
-          <p:cNvPicPr>
-            <a:picLocks noGrp="1" noRot="1" noChangeAspect="1" noMove="1" noResize="1" noEditPoints="1" noAdjustHandles="1" noChangeArrowheads="1" noChangeShapeType="1" noCrop="1"/>
-          </p:cNvPicPr>
-          <p:nvPr>
-            <p:extLst>
-              <p:ext uri="{386F3935-93C4-4BCD-93E2-E3B085C9AB24}">
-                <p16:designElem xmlns:p16="http://schemas.microsoft.com/office/powerpoint/2015/main" val="1"/>
-              </p:ext>
-            </p:extLst>
-          </p:nvPr>
-        </p:nvPicPr>
-        <p:blipFill rotWithShape="1">
-          <a:blip r:embed="rId6">
-            <a:extLst>
-              <a:ext uri="{28A0092B-C50C-407E-A947-70E740481C1C}">
-                <a14:useLocalDpi xmlns:a14="http://schemas.microsoft.com/office/drawing/2010/main" val="0"/>
-              </a:ext>
-            </a:extLst>
-          </a:blip>
-          <a:srcRect b="23320"/>
-          <a:stretch/>
-        </p:blipFill>
-        <p:spPr>
-          <a:xfrm>
-            <a:off x="8605878" y="6096000"/>
-            <a:ext cx="993734" cy="762000"/>
-          </a:xfrm>
-          <a:prstGeom prst="rect">
-            <a:avLst/>
-          </a:prstGeom>
-        </p:spPr>
-      </p:pic>
-      <p:sp>
-        <p:nvSpPr>
-          <p:cNvPr id="20" name="Rectangle 19">
-            <a:extLst>
-              <a:ext uri="{FF2B5EF4-FFF2-40B4-BE49-F238E27FC236}">
-                <a16:creationId xmlns:a16="http://schemas.microsoft.com/office/drawing/2014/main" id="{DE4D62F9-188E-4530-84C2-24BDEE4BEB82}"/>
-              </a:ext>
-              <a:ext uri="{C183D7F6-B498-43B3-948B-1728B52AA6E4}">
-                <adec:decorative xmlns:adec="http://schemas.microsoft.com/office/drawing/2017/decorative" val="1"/>
-              </a:ext>
-            </a:extLst>
-          </p:cNvPr>
-          <p:cNvSpPr>
-            <a:spLocks noGrp="1" noRot="1" noChangeAspect="1" noMove="1" noResize="1" noEditPoints="1" noAdjustHandles="1" noChangeArrowheads="1" noChangeShapeType="1" noTextEdit="1"/>
-          </p:cNvSpPr>
-          <p:nvPr>
-            <p:extLst>
-              <p:ext uri="{386F3935-93C4-4BCD-93E2-E3B085C9AB24}">
-                <p16:designElem xmlns:p16="http://schemas.microsoft.com/office/powerpoint/2015/main" val="1"/>
-              </p:ext>
-            </p:extLst>
-          </p:nvPr>
-        </p:nvSpPr>
-        <p:spPr>
-          <a:xfrm>
-            <a:off x="10437812" y="0"/>
-            <a:ext cx="685800" cy="1143000"/>
-          </a:xfrm>
-          <a:prstGeom prst="rect">
-            <a:avLst/>
-          </a:prstGeom>
-          <a:solidFill>
-            <a:schemeClr val="accent1"/>
-          </a:solidFill>
-          <a:ln>
-            <a:noFill/>
-          </a:ln>
-        </p:spPr>
-        <p:style>
-          <a:lnRef idx="1">
-            <a:schemeClr val="accent1"/>
-          </a:lnRef>
-          <a:fillRef idx="3">
-            <a:schemeClr val="accent1"/>
-          </a:fillRef>
-          <a:effectRef idx="2">
-            <a:schemeClr val="accent1"/>
-          </a:effectRef>
-          <a:fontRef idx="minor">
-            <a:schemeClr val="lt1"/>
-          </a:fontRef>
-        </p:style>
-      </p:sp>
-      <p:sp>
-        <p:nvSpPr>
-          <p:cNvPr id="2" name="Titre 1">
-            <a:extLst>
-              <a:ext uri="{FF2B5EF4-FFF2-40B4-BE49-F238E27FC236}">
-                <a16:creationId xmlns:a16="http://schemas.microsoft.com/office/drawing/2014/main" id="{9D0E9B87-70C6-4F83-ABAB-8A07F967B344}"/>
-              </a:ext>
-            </a:extLst>
-          </p:cNvPr>
-          <p:cNvSpPr>
-            <a:spLocks noGrp="1"/>
-          </p:cNvSpPr>
-          <p:nvPr>
-            <p:ph type="title"/>
-          </p:nvPr>
-        </p:nvSpPr>
-        <p:spPr>
-          <a:xfrm>
-            <a:off x="6683829" y="1447800"/>
-            <a:ext cx="5007428" cy="3329581"/>
-          </a:xfrm>
-        </p:spPr>
-        <p:txBody>
-          <a:bodyPr vert="horz" lIns="91440" tIns="45720" rIns="91440" bIns="45720" rtlCol="0" anchor="b">
-            <a:normAutofit/>
-          </a:bodyPr>
-          <a:lstStyle/>
-          <a:p>
-            <a:pPr algn="ctr">
-              <a:lnSpc>
-                <a:spcPct val="90000"/>
-              </a:lnSpc>
-            </a:pPr>
-            <a:r>
-              <a:rPr lang="en-US" sz="4400" b="0" i="0" kern="1200" dirty="0" err="1">
-                <a:solidFill>
-                  <a:schemeClr val="tx2"/>
-                </a:solidFill>
-                <a:latin typeface="+mj-lt"/>
-                <a:ea typeface="+mj-ea"/>
-                <a:cs typeface="+mj-cs"/>
-              </a:rPr>
-              <a:t>Création</a:t>
-            </a:r>
-            <a:r>
-              <a:rPr lang="en-US" sz="4400" b="0" i="0" kern="1200" dirty="0">
-                <a:solidFill>
-                  <a:schemeClr val="tx2"/>
-                </a:solidFill>
-                <a:latin typeface="+mj-lt"/>
-                <a:ea typeface="+mj-ea"/>
-                <a:cs typeface="+mj-cs"/>
-              </a:rPr>
-              <a:t> de la BDD </a:t>
-            </a:r>
-            <a:r>
-              <a:rPr lang="en-US" sz="4400" b="0" i="0" kern="1200" dirty="0" err="1">
-                <a:solidFill>
-                  <a:schemeClr val="tx2"/>
-                </a:solidFill>
-                <a:latin typeface="+mj-lt"/>
-                <a:ea typeface="+mj-ea"/>
-                <a:cs typeface="+mj-cs"/>
-              </a:rPr>
-              <a:t>Mysql</a:t>
-            </a:r>
-            <a:r>
-              <a:rPr lang="en-US" sz="4400" b="0" i="0" kern="1200" dirty="0">
-                <a:solidFill>
-                  <a:schemeClr val="tx2"/>
-                </a:solidFill>
-                <a:latin typeface="+mj-lt"/>
-                <a:ea typeface="+mj-ea"/>
-                <a:cs typeface="+mj-cs"/>
-              </a:rPr>
-              <a:t> RDS</a:t>
-            </a:r>
-            <a:br>
-              <a:rPr lang="en-US" sz="5600" b="0" i="0" kern="1200" dirty="0">
-                <a:solidFill>
-                  <a:schemeClr val="tx2"/>
-                </a:solidFill>
-                <a:latin typeface="+mj-lt"/>
-                <a:ea typeface="+mj-ea"/>
-                <a:cs typeface="+mj-cs"/>
-              </a:rPr>
-            </a:br>
-            <a:endParaRPr lang="en-US" sz="5600" b="0" i="0" kern="1200" dirty="0">
-              <a:solidFill>
-                <a:schemeClr val="tx2"/>
-              </a:solidFill>
-              <a:latin typeface="+mj-lt"/>
-              <a:ea typeface="+mj-ea"/>
-              <a:cs typeface="+mj-cs"/>
-            </a:endParaRPr>
-          </a:p>
-        </p:txBody>
-      </p:sp>
-      <p:pic>
-        <p:nvPicPr>
-          <p:cNvPr id="5" name="Image 4">
-            <a:extLst>
-              <a:ext uri="{FF2B5EF4-FFF2-40B4-BE49-F238E27FC236}">
-                <a16:creationId xmlns:a16="http://schemas.microsoft.com/office/drawing/2014/main" id="{0753D3C2-60EB-4393-BDA3-EB5836B39730}"/>
+                <a16:creationId xmlns:a16="http://schemas.microsoft.com/office/drawing/2014/main" id="{17DCC8C1-CA9B-419C-810E-651408F419BF}"/>
               </a:ext>
             </a:extLst>
           </p:cNvPr>
@@ -11892,80 +12082,25 @@
           <p:nvPr/>
         </p:nvPicPr>
         <p:blipFill>
-          <a:blip r:embed="rId7"/>
+          <a:blip r:embed="rId2"/>
           <a:stretch>
             <a:fillRect/>
           </a:stretch>
         </p:blipFill>
         <p:spPr>
           <a:xfrm>
-            <a:off x="1081703" y="647698"/>
-            <a:ext cx="4574858" cy="5562139"/>
+            <a:off x="1427577" y="1655580"/>
+            <a:ext cx="9336845" cy="3546839"/>
           </a:xfrm>
           <a:prstGeom prst="rect">
             <a:avLst/>
           </a:prstGeom>
-          <a:effectLst/>
         </p:spPr>
       </p:pic>
-      <p:sp>
-        <p:nvSpPr>
-          <p:cNvPr id="4" name="Espace réservé du numéro de diapositive 3">
-            <a:extLst>
-              <a:ext uri="{FF2B5EF4-FFF2-40B4-BE49-F238E27FC236}">
-                <a16:creationId xmlns:a16="http://schemas.microsoft.com/office/drawing/2014/main" id="{CB5C9C78-38D6-4212-9E31-5DA00AA2DE89}"/>
-              </a:ext>
-            </a:extLst>
-          </p:cNvPr>
-          <p:cNvSpPr>
-            <a:spLocks noGrp="1"/>
-          </p:cNvSpPr>
-          <p:nvPr>
-            <p:ph type="sldNum" sz="quarter" idx="12"/>
-          </p:nvPr>
-        </p:nvSpPr>
-        <p:spPr>
-          <a:xfrm>
-            <a:off x="10352540" y="295729"/>
-            <a:ext cx="838199" cy="767687"/>
-          </a:xfrm>
-        </p:spPr>
-        <p:txBody>
-          <a:bodyPr vert="horz" lIns="91440" tIns="45720" rIns="91440" bIns="45720" rtlCol="0" anchor="b">
-            <a:normAutofit/>
-          </a:bodyPr>
-          <a:lstStyle/>
-          <a:p>
-            <a:pPr defTabSz="914400">
-              <a:spcAft>
-                <a:spcPts val="600"/>
-              </a:spcAft>
-            </a:pPr>
-            <a:fld id="{D57F1E4F-1CFF-5643-939E-02111984F565}" type="slidenum">
-              <a:rPr lang="en-US">
-                <a:solidFill>
-                  <a:srgbClr val="FFFFFF"/>
-                </a:solidFill>
-              </a:rPr>
-              <a:pPr defTabSz="914400">
-                <a:spcAft>
-                  <a:spcPts val="600"/>
-                </a:spcAft>
-              </a:pPr>
-              <a:t>9</a:t>
-            </a:fld>
-            <a:endParaRPr lang="en-US">
-              <a:solidFill>
-                <a:srgbClr val="FFFFFF"/>
-              </a:solidFill>
-            </a:endParaRPr>
-          </a:p>
-        </p:txBody>
-      </p:sp>
     </p:spTree>
     <p:extLst>
       <p:ext uri="{BB962C8B-B14F-4D97-AF65-F5344CB8AC3E}">
-        <p14:creationId xmlns:p14="http://schemas.microsoft.com/office/powerpoint/2010/main" val="2152293383"/>
+        <p14:creationId xmlns:p14="http://schemas.microsoft.com/office/powerpoint/2010/main" val="3576209573"/>
       </p:ext>
     </p:extLst>
   </p:cSld>

</xml_diff>